<commit_message>
Fix typos on slide LinkedLists ProsCons
</commit_message>
<xml_diff>
--- a/lections/4_data_structures_1.pptx
+++ b/lections/4_data_structures_1.pptx
@@ -2447,7 +2447,7 @@
           </a:ln>
           <a:extLst>
             <a:ext uri="{C572A759-6A51-4108-AA02-DFA0A04FC94B}">
-              <ma14:wrappingTextBoxFlag xmlns:ma14="http://schemas.microsoft.com/office/mac/drawingml/2011/main" xmlns:a14="http://schemas.microsoft.com/office/drawing/2010/main" xmlns:m="http://schemas.openxmlformats.org/officeDocument/2006/math" xmlns="" val="1"/>
+              <ma14:wrappingTextBoxFlag xmlns="" xmlns:m="http://schemas.openxmlformats.org/officeDocument/2006/math" xmlns:a14="http://schemas.microsoft.com/office/drawing/2010/main" xmlns:ma14="http://schemas.microsoft.com/office/mac/drawingml/2011/main" val="1"/>
             </a:ext>
           </a:extLst>
         </p:spPr>
@@ -2486,7 +2486,7 @@
           </a:ln>
           <a:extLst>
             <a:ext uri="{C572A759-6A51-4108-AA02-DFA0A04FC94B}">
-              <ma14:wrappingTextBoxFlag xmlns:ma14="http://schemas.microsoft.com/office/mac/drawingml/2011/main" xmlns:a14="http://schemas.microsoft.com/office/drawing/2010/main" xmlns:m="http://schemas.openxmlformats.org/officeDocument/2006/math" xmlns="" val="1"/>
+              <ma14:wrappingTextBoxFlag xmlns="" xmlns:m="http://schemas.openxmlformats.org/officeDocument/2006/math" xmlns:a14="http://schemas.microsoft.com/office/drawing/2010/main" xmlns:ma14="http://schemas.microsoft.com/office/mac/drawingml/2011/main" val="1"/>
             </a:ext>
           </a:extLst>
         </p:spPr>
@@ -3484,7 +3484,7 @@
           </a:ln>
           <a:extLst>
             <a:ext uri="{C572A759-6A51-4108-AA02-DFA0A04FC94B}">
-              <ma14:wrappingTextBoxFlag xmlns:ma14="http://schemas.microsoft.com/office/mac/drawingml/2011/main" xmlns:a14="http://schemas.microsoft.com/office/drawing/2010/main" xmlns:m="http://schemas.openxmlformats.org/officeDocument/2006/math" xmlns="" val="1"/>
+              <ma14:wrappingTextBoxFlag xmlns="" xmlns:m="http://schemas.openxmlformats.org/officeDocument/2006/math" xmlns:a14="http://schemas.microsoft.com/office/drawing/2010/main" xmlns:ma14="http://schemas.microsoft.com/office/mac/drawingml/2011/main" val="1"/>
             </a:ext>
           </a:extLst>
         </p:spPr>
@@ -3517,7 +3517,7 @@
           </a:ln>
           <a:extLst>
             <a:ext uri="{C572A759-6A51-4108-AA02-DFA0A04FC94B}">
-              <ma14:wrappingTextBoxFlag xmlns:ma14="http://schemas.microsoft.com/office/mac/drawingml/2011/main" xmlns:a14="http://schemas.microsoft.com/office/drawing/2010/main" xmlns:m="http://schemas.openxmlformats.org/officeDocument/2006/math" xmlns="" val="1"/>
+              <ma14:wrappingTextBoxFlag xmlns="" xmlns:m="http://schemas.openxmlformats.org/officeDocument/2006/math" xmlns:a14="http://schemas.microsoft.com/office/drawing/2010/main" xmlns:ma14="http://schemas.microsoft.com/office/mac/drawingml/2011/main" val="1"/>
             </a:ext>
           </a:extLst>
         </p:spPr>
@@ -3569,7 +3569,7 @@
           </a:ln>
           <a:extLst>
             <a:ext uri="{C572A759-6A51-4108-AA02-DFA0A04FC94B}">
-              <ma14:wrappingTextBoxFlag xmlns:ma14="http://schemas.microsoft.com/office/mac/drawingml/2011/main" xmlns:a14="http://schemas.microsoft.com/office/drawing/2010/main" xmlns:m="http://schemas.openxmlformats.org/officeDocument/2006/math" xmlns="" val="1"/>
+              <ma14:wrappingTextBoxFlag xmlns="" xmlns:m="http://schemas.openxmlformats.org/officeDocument/2006/math" xmlns:a14="http://schemas.microsoft.com/office/drawing/2010/main" xmlns:ma14="http://schemas.microsoft.com/office/mac/drawingml/2011/main" val="1"/>
             </a:ext>
           </a:extLst>
         </p:spPr>
@@ -3673,7 +3673,7 @@
           </a:ln>
           <a:extLst>
             <a:ext uri="{C572A759-6A51-4108-AA02-DFA0A04FC94B}">
-              <ma14:wrappingTextBoxFlag xmlns:ma14="http://schemas.microsoft.com/office/mac/drawingml/2011/main" xmlns:a14="http://schemas.microsoft.com/office/drawing/2010/main" xmlns:m="http://schemas.openxmlformats.org/officeDocument/2006/math" xmlns="" val="1"/>
+              <ma14:wrappingTextBoxFlag xmlns="" xmlns:m="http://schemas.openxmlformats.org/officeDocument/2006/math" xmlns:a14="http://schemas.microsoft.com/office/drawing/2010/main" xmlns:ma14="http://schemas.microsoft.com/office/mac/drawingml/2011/main" val="1"/>
             </a:ext>
           </a:extLst>
         </p:spPr>
@@ -3710,7 +3710,7 @@
           </a:ln>
           <a:extLst>
             <a:ext uri="{C572A759-6A51-4108-AA02-DFA0A04FC94B}">
-              <ma14:wrappingTextBoxFlag xmlns:ma14="http://schemas.microsoft.com/office/mac/drawingml/2011/main" xmlns:a14="http://schemas.microsoft.com/office/drawing/2010/main" xmlns:m="http://schemas.openxmlformats.org/officeDocument/2006/math" xmlns="" val="1"/>
+              <ma14:wrappingTextBoxFlag xmlns="" xmlns:m="http://schemas.openxmlformats.org/officeDocument/2006/math" xmlns:a14="http://schemas.microsoft.com/office/drawing/2010/main" xmlns:ma14="http://schemas.microsoft.com/office/mac/drawingml/2011/main" val="1"/>
             </a:ext>
           </a:extLst>
         </p:spPr>
@@ -3771,7 +3771,7 @@
           </a:ln>
           <a:extLst>
             <a:ext uri="{C572A759-6A51-4108-AA02-DFA0A04FC94B}">
-              <ma14:wrappingTextBoxFlag xmlns:ma14="http://schemas.microsoft.com/office/mac/drawingml/2011/main" xmlns:a14="http://schemas.microsoft.com/office/drawing/2010/main" xmlns:m="http://schemas.openxmlformats.org/officeDocument/2006/math" xmlns="" val="1"/>
+              <ma14:wrappingTextBoxFlag xmlns="" xmlns:m="http://schemas.openxmlformats.org/officeDocument/2006/math" xmlns:a14="http://schemas.microsoft.com/office/drawing/2010/main" xmlns:ma14="http://schemas.microsoft.com/office/mac/drawingml/2011/main" val="1"/>
             </a:ext>
           </a:extLst>
         </p:spPr>
@@ -3947,7 +3947,7 @@
           </a:ln>
           <a:extLst>
             <a:ext uri="{C572A759-6A51-4108-AA02-DFA0A04FC94B}">
-              <ma14:wrappingTextBoxFlag xmlns:ma14="http://schemas.microsoft.com/office/mac/drawingml/2011/main" xmlns:a14="http://schemas.microsoft.com/office/drawing/2010/main" xmlns:m="http://schemas.openxmlformats.org/officeDocument/2006/math" xmlns="" val="1"/>
+              <ma14:wrappingTextBoxFlag xmlns="" xmlns:m="http://schemas.openxmlformats.org/officeDocument/2006/math" xmlns:a14="http://schemas.microsoft.com/office/drawing/2010/main" xmlns:ma14="http://schemas.microsoft.com/office/mac/drawingml/2011/main" val="1"/>
             </a:ext>
           </a:extLst>
         </p:spPr>
@@ -3984,7 +3984,7 @@
           </a:ln>
           <a:extLst>
             <a:ext uri="{C572A759-6A51-4108-AA02-DFA0A04FC94B}">
-              <ma14:wrappingTextBoxFlag xmlns:ma14="http://schemas.microsoft.com/office/mac/drawingml/2011/main" xmlns:a14="http://schemas.microsoft.com/office/drawing/2010/main" xmlns:m="http://schemas.openxmlformats.org/officeDocument/2006/math" xmlns="" val="1"/>
+              <ma14:wrappingTextBoxFlag xmlns="" xmlns:m="http://schemas.openxmlformats.org/officeDocument/2006/math" xmlns:a14="http://schemas.microsoft.com/office/drawing/2010/main" xmlns:ma14="http://schemas.microsoft.com/office/mac/drawingml/2011/main" val="1"/>
             </a:ext>
           </a:extLst>
         </p:spPr>
@@ -4041,7 +4041,7 @@
           </a:ln>
           <a:extLst>
             <a:ext uri="{C572A759-6A51-4108-AA02-DFA0A04FC94B}">
-              <ma14:wrappingTextBoxFlag xmlns:ma14="http://schemas.microsoft.com/office/mac/drawingml/2011/main" xmlns:a14="http://schemas.microsoft.com/office/drawing/2010/main" xmlns:m="http://schemas.openxmlformats.org/officeDocument/2006/math" xmlns="" val="1"/>
+              <ma14:wrappingTextBoxFlag xmlns="" xmlns:m="http://schemas.openxmlformats.org/officeDocument/2006/math" xmlns:a14="http://schemas.microsoft.com/office/drawing/2010/main" xmlns:ma14="http://schemas.microsoft.com/office/mac/drawingml/2011/main" val="1"/>
             </a:ext>
           </a:extLst>
         </p:spPr>
@@ -4238,7 +4238,7 @@
           </a:ln>
           <a:extLst>
             <a:ext uri="{C572A759-6A51-4108-AA02-DFA0A04FC94B}">
-              <ma14:wrappingTextBoxFlag xmlns:ma14="http://schemas.microsoft.com/office/mac/drawingml/2011/main" xmlns:a14="http://schemas.microsoft.com/office/drawing/2010/main" xmlns:m="http://schemas.openxmlformats.org/officeDocument/2006/math" xmlns="" val="1"/>
+              <ma14:wrappingTextBoxFlag xmlns="" xmlns:m="http://schemas.openxmlformats.org/officeDocument/2006/math" xmlns:a14="http://schemas.microsoft.com/office/drawing/2010/main" xmlns:ma14="http://schemas.microsoft.com/office/mac/drawingml/2011/main" val="1"/>
             </a:ext>
           </a:extLst>
         </p:spPr>
@@ -4275,7 +4275,7 @@
           </a:ln>
           <a:extLst>
             <a:ext uri="{C572A759-6A51-4108-AA02-DFA0A04FC94B}">
-              <ma14:wrappingTextBoxFlag xmlns:ma14="http://schemas.microsoft.com/office/mac/drawingml/2011/main" xmlns:a14="http://schemas.microsoft.com/office/drawing/2010/main" xmlns:m="http://schemas.openxmlformats.org/officeDocument/2006/math" xmlns="" val="1"/>
+              <ma14:wrappingTextBoxFlag xmlns="" xmlns:m="http://schemas.openxmlformats.org/officeDocument/2006/math" xmlns:a14="http://schemas.microsoft.com/office/drawing/2010/main" xmlns:ma14="http://schemas.microsoft.com/office/mac/drawingml/2011/main" val="1"/>
             </a:ext>
           </a:extLst>
         </p:spPr>
@@ -4332,7 +4332,7 @@
           </a:ln>
           <a:extLst>
             <a:ext uri="{C572A759-6A51-4108-AA02-DFA0A04FC94B}">
-              <ma14:wrappingTextBoxFlag xmlns:ma14="http://schemas.microsoft.com/office/mac/drawingml/2011/main" xmlns:a14="http://schemas.microsoft.com/office/drawing/2010/main" xmlns:m="http://schemas.openxmlformats.org/officeDocument/2006/math" xmlns="" val="1"/>
+              <ma14:wrappingTextBoxFlag xmlns="" xmlns:m="http://schemas.openxmlformats.org/officeDocument/2006/math" xmlns:a14="http://schemas.microsoft.com/office/drawing/2010/main" xmlns:ma14="http://schemas.microsoft.com/office/mac/drawingml/2011/main" val="1"/>
             </a:ext>
           </a:extLst>
         </p:spPr>
@@ -4529,7 +4529,7 @@
           </a:ln>
           <a:extLst>
             <a:ext uri="{C572A759-6A51-4108-AA02-DFA0A04FC94B}">
-              <ma14:wrappingTextBoxFlag xmlns:ma14="http://schemas.microsoft.com/office/mac/drawingml/2011/main" xmlns:a14="http://schemas.microsoft.com/office/drawing/2010/main" xmlns:m="http://schemas.openxmlformats.org/officeDocument/2006/math" xmlns="" val="1"/>
+              <ma14:wrappingTextBoxFlag xmlns="" xmlns:m="http://schemas.openxmlformats.org/officeDocument/2006/math" xmlns:a14="http://schemas.microsoft.com/office/drawing/2010/main" xmlns:ma14="http://schemas.microsoft.com/office/mac/drawingml/2011/main" val="1"/>
             </a:ext>
           </a:extLst>
         </p:spPr>
@@ -4566,7 +4566,7 @@
           </a:ln>
           <a:extLst>
             <a:ext uri="{C572A759-6A51-4108-AA02-DFA0A04FC94B}">
-              <ma14:wrappingTextBoxFlag xmlns:ma14="http://schemas.microsoft.com/office/mac/drawingml/2011/main" xmlns:a14="http://schemas.microsoft.com/office/drawing/2010/main" xmlns:m="http://schemas.openxmlformats.org/officeDocument/2006/math" xmlns="" val="1"/>
+              <ma14:wrappingTextBoxFlag xmlns="" xmlns:m="http://schemas.openxmlformats.org/officeDocument/2006/math" xmlns:a14="http://schemas.microsoft.com/office/drawing/2010/main" xmlns:ma14="http://schemas.microsoft.com/office/mac/drawingml/2011/main" val="1"/>
             </a:ext>
           </a:extLst>
         </p:spPr>
@@ -4623,7 +4623,7 @@
           </a:ln>
           <a:extLst>
             <a:ext uri="{C572A759-6A51-4108-AA02-DFA0A04FC94B}">
-              <ma14:wrappingTextBoxFlag xmlns:ma14="http://schemas.microsoft.com/office/mac/drawingml/2011/main" xmlns:a14="http://schemas.microsoft.com/office/drawing/2010/main" xmlns:m="http://schemas.openxmlformats.org/officeDocument/2006/math" xmlns="" val="1"/>
+              <ma14:wrappingTextBoxFlag xmlns="" xmlns:m="http://schemas.openxmlformats.org/officeDocument/2006/math" xmlns:a14="http://schemas.microsoft.com/office/drawing/2010/main" xmlns:ma14="http://schemas.microsoft.com/office/mac/drawingml/2011/main" val="1"/>
             </a:ext>
           </a:extLst>
         </p:spPr>
@@ -4820,7 +4820,7 @@
           </a:ln>
           <a:extLst>
             <a:ext uri="{C572A759-6A51-4108-AA02-DFA0A04FC94B}">
-              <ma14:wrappingTextBoxFlag xmlns:ma14="http://schemas.microsoft.com/office/mac/drawingml/2011/main" xmlns:a14="http://schemas.microsoft.com/office/drawing/2010/main" xmlns:m="http://schemas.openxmlformats.org/officeDocument/2006/math" xmlns="" val="1"/>
+              <ma14:wrappingTextBoxFlag xmlns="" xmlns:m="http://schemas.openxmlformats.org/officeDocument/2006/math" xmlns:a14="http://schemas.microsoft.com/office/drawing/2010/main" xmlns:ma14="http://schemas.microsoft.com/office/mac/drawingml/2011/main" val="1"/>
             </a:ext>
           </a:extLst>
         </p:spPr>
@@ -4857,7 +4857,7 @@
           </a:ln>
           <a:extLst>
             <a:ext uri="{C572A759-6A51-4108-AA02-DFA0A04FC94B}">
-              <ma14:wrappingTextBoxFlag xmlns:ma14="http://schemas.microsoft.com/office/mac/drawingml/2011/main" xmlns:a14="http://schemas.microsoft.com/office/drawing/2010/main" xmlns:m="http://schemas.openxmlformats.org/officeDocument/2006/math" xmlns="" val="1"/>
+              <ma14:wrappingTextBoxFlag xmlns="" xmlns:m="http://schemas.openxmlformats.org/officeDocument/2006/math" xmlns:a14="http://schemas.microsoft.com/office/drawing/2010/main" xmlns:ma14="http://schemas.microsoft.com/office/mac/drawingml/2011/main" val="1"/>
             </a:ext>
           </a:extLst>
         </p:spPr>
@@ -5797,7 +5797,7 @@
           </a:ln>
           <a:extLst>
             <a:ext uri="{C572A759-6A51-4108-AA02-DFA0A04FC94B}">
-              <ma14:wrappingTextBoxFlag xmlns:ma14="http://schemas.microsoft.com/office/mac/drawingml/2011/main" xmlns:a14="http://schemas.microsoft.com/office/drawing/2010/main" xmlns:m="http://schemas.openxmlformats.org/officeDocument/2006/math" xmlns="" val="1"/>
+              <ma14:wrappingTextBoxFlag xmlns="" xmlns:m="http://schemas.openxmlformats.org/officeDocument/2006/math" xmlns:a14="http://schemas.microsoft.com/office/drawing/2010/main" xmlns:ma14="http://schemas.microsoft.com/office/mac/drawingml/2011/main" val="1"/>
             </a:ext>
           </a:extLst>
         </p:spPr>
@@ -5834,7 +5834,7 @@
           </a:ln>
           <a:extLst>
             <a:ext uri="{C572A759-6A51-4108-AA02-DFA0A04FC94B}">
-              <ma14:wrappingTextBoxFlag xmlns:ma14="http://schemas.microsoft.com/office/mac/drawingml/2011/main" xmlns:a14="http://schemas.microsoft.com/office/drawing/2010/main" xmlns:m="http://schemas.openxmlformats.org/officeDocument/2006/math" xmlns="" val="1"/>
+              <ma14:wrappingTextBoxFlag xmlns="" xmlns:m="http://schemas.openxmlformats.org/officeDocument/2006/math" xmlns:a14="http://schemas.microsoft.com/office/drawing/2010/main" xmlns:ma14="http://schemas.microsoft.com/office/mac/drawingml/2011/main" val="1"/>
             </a:ext>
           </a:extLst>
         </p:spPr>
@@ -6794,7 +6794,7 @@
           </a:ln>
           <a:extLst>
             <a:ext uri="{C572A759-6A51-4108-AA02-DFA0A04FC94B}">
-              <ma14:wrappingTextBoxFlag xmlns:ma14="http://schemas.microsoft.com/office/mac/drawingml/2011/main" xmlns:a14="http://schemas.microsoft.com/office/drawing/2010/main" xmlns:m="http://schemas.openxmlformats.org/officeDocument/2006/math" xmlns="" val="1"/>
+              <ma14:wrappingTextBoxFlag xmlns="" xmlns:m="http://schemas.openxmlformats.org/officeDocument/2006/math" xmlns:a14="http://schemas.microsoft.com/office/drawing/2010/main" xmlns:ma14="http://schemas.microsoft.com/office/mac/drawingml/2011/main" val="1"/>
             </a:ext>
           </a:extLst>
         </p:spPr>
@@ -6831,7 +6831,7 @@
           </a:ln>
           <a:extLst>
             <a:ext uri="{C572A759-6A51-4108-AA02-DFA0A04FC94B}">
-              <ma14:wrappingTextBoxFlag xmlns:ma14="http://schemas.microsoft.com/office/mac/drawingml/2011/main" xmlns:a14="http://schemas.microsoft.com/office/drawing/2010/main" xmlns:m="http://schemas.openxmlformats.org/officeDocument/2006/math" xmlns="" val="1"/>
+              <ma14:wrappingTextBoxFlag xmlns="" xmlns:m="http://schemas.openxmlformats.org/officeDocument/2006/math" xmlns:a14="http://schemas.microsoft.com/office/drawing/2010/main" xmlns:ma14="http://schemas.microsoft.com/office/mac/drawingml/2011/main" val="1"/>
             </a:ext>
           </a:extLst>
         </p:spPr>
@@ -6986,7 +6986,7 @@
           </a:ln>
           <a:extLst>
             <a:ext uri="{C572A759-6A51-4108-AA02-DFA0A04FC94B}">
-              <ma14:wrappingTextBoxFlag xmlns:ma14="http://schemas.microsoft.com/office/mac/drawingml/2011/main" xmlns:a14="http://schemas.microsoft.com/office/drawing/2010/main" xmlns:m="http://schemas.openxmlformats.org/officeDocument/2006/math" xmlns="" val="1"/>
+              <ma14:wrappingTextBoxFlag xmlns="" xmlns:m="http://schemas.openxmlformats.org/officeDocument/2006/math" xmlns:a14="http://schemas.microsoft.com/office/drawing/2010/main" xmlns:ma14="http://schemas.microsoft.com/office/mac/drawingml/2011/main" val="1"/>
             </a:ext>
           </a:extLst>
         </p:spPr>
@@ -7042,7 +7042,7 @@
           </a:ln>
           <a:extLst>
             <a:ext uri="{C572A759-6A51-4108-AA02-DFA0A04FC94B}">
-              <ma14:wrappingTextBoxFlag xmlns:ma14="http://schemas.microsoft.com/office/mac/drawingml/2011/main" xmlns:a14="http://schemas.microsoft.com/office/drawing/2010/main" xmlns:m="http://schemas.openxmlformats.org/officeDocument/2006/math" xmlns="" val="1"/>
+              <ma14:wrappingTextBoxFlag xmlns="" xmlns:m="http://schemas.openxmlformats.org/officeDocument/2006/math" xmlns:a14="http://schemas.microsoft.com/office/drawing/2010/main" xmlns:ma14="http://schemas.microsoft.com/office/mac/drawingml/2011/main" val="1"/>
             </a:ext>
           </a:extLst>
         </p:spPr>
@@ -7099,7 +7099,7 @@
           </a:ln>
           <a:extLst>
             <a:ext uri="{C572A759-6A51-4108-AA02-DFA0A04FC94B}">
-              <ma14:wrappingTextBoxFlag xmlns:ma14="http://schemas.microsoft.com/office/mac/drawingml/2011/main" xmlns:a14="http://schemas.microsoft.com/office/drawing/2010/main" xmlns:m="http://schemas.openxmlformats.org/officeDocument/2006/math" xmlns="" val="1"/>
+              <ma14:wrappingTextBoxFlag xmlns="" xmlns:m="http://schemas.openxmlformats.org/officeDocument/2006/math" xmlns:a14="http://schemas.microsoft.com/office/drawing/2010/main" xmlns:ma14="http://schemas.microsoft.com/office/mac/drawingml/2011/main" val="1"/>
             </a:ext>
           </a:extLst>
         </p:spPr>
@@ -7125,7 +7125,7 @@
             <a:pPr algn="just"/>
             <a:r>
               <a:rPr lang="ru-RU" sz="2400" dirty="0"/>
-              <a:t>При работе с большими объектами перемещение указателей проще чем копирование</a:t>
+              <a:t>При работе с большими объектами перемещение указателей проще, чем копирование</a:t>
             </a:r>
             <a:endParaRPr sz="2400" dirty="0"/>
           </a:p>
@@ -7250,7 +7250,7 @@
           </a:ln>
           <a:extLst>
             <a:ext uri="{C572A759-6A51-4108-AA02-DFA0A04FC94B}">
-              <ma14:wrappingTextBoxFlag xmlns:ma14="http://schemas.microsoft.com/office/mac/drawingml/2011/main" xmlns:a14="http://schemas.microsoft.com/office/drawing/2010/main" xmlns:m="http://schemas.openxmlformats.org/officeDocument/2006/math" xmlns="" val="1"/>
+              <ma14:wrappingTextBoxFlag xmlns="" xmlns:m="http://schemas.openxmlformats.org/officeDocument/2006/math" xmlns:a14="http://schemas.microsoft.com/office/drawing/2010/main" xmlns:ma14="http://schemas.microsoft.com/office/mac/drawingml/2011/main" val="1"/>
             </a:ext>
           </a:extLst>
         </p:spPr>
@@ -7275,7 +7275,7 @@
           <a:p>
             <a:r>
               <a:rPr lang="ru-RU" sz="2400" dirty="0"/>
-              <a:t>Использую дополнительную память для указателей</a:t>
+              <a:t>Используют дополнительную память для указателей</a:t>
             </a:r>
             <a:endParaRPr sz="2400" dirty="0"/>
           </a:p>
@@ -7353,7 +7353,7 @@
           </a:ln>
           <a:extLst>
             <a:ext uri="{C572A759-6A51-4108-AA02-DFA0A04FC94B}">
-              <ma14:wrappingTextBoxFlag xmlns:ma14="http://schemas.microsoft.com/office/mac/drawingml/2011/main" xmlns:a14="http://schemas.microsoft.com/office/drawing/2010/main" xmlns:m="http://schemas.openxmlformats.org/officeDocument/2006/math" xmlns="" val="1"/>
+              <ma14:wrappingTextBoxFlag xmlns="" xmlns:m="http://schemas.openxmlformats.org/officeDocument/2006/math" xmlns:a14="http://schemas.microsoft.com/office/drawing/2010/main" xmlns:ma14="http://schemas.microsoft.com/office/mac/drawingml/2011/main" val="1"/>
             </a:ext>
           </a:extLst>
         </p:spPr>
@@ -7456,7 +7456,7 @@
           </a:ln>
           <a:extLst>
             <a:ext uri="{C572A759-6A51-4108-AA02-DFA0A04FC94B}">
-              <ma14:wrappingTextBoxFlag xmlns:ma14="http://schemas.microsoft.com/office/mac/drawingml/2011/main" xmlns:a14="http://schemas.microsoft.com/office/drawing/2010/main" xmlns:m="http://schemas.openxmlformats.org/officeDocument/2006/math" xmlns="" val="1"/>
+              <ma14:wrappingTextBoxFlag xmlns="" xmlns:m="http://schemas.openxmlformats.org/officeDocument/2006/math" xmlns:a14="http://schemas.microsoft.com/office/drawing/2010/main" xmlns:ma14="http://schemas.microsoft.com/office/mac/drawingml/2011/main" val="1"/>
             </a:ext>
           </a:extLst>
         </p:spPr>
@@ -7564,7 +7564,7 @@
           </a:ln>
           <a:extLst>
             <a:ext uri="{C572A759-6A51-4108-AA02-DFA0A04FC94B}">
-              <ma14:wrappingTextBoxFlag xmlns:ma14="http://schemas.microsoft.com/office/mac/drawingml/2011/main" xmlns:a14="http://schemas.microsoft.com/office/drawing/2010/main" xmlns:m="http://schemas.openxmlformats.org/officeDocument/2006/math" xmlns="" val="1"/>
+              <ma14:wrappingTextBoxFlag xmlns="" xmlns:m="http://schemas.openxmlformats.org/officeDocument/2006/math" xmlns:a14="http://schemas.microsoft.com/office/drawing/2010/main" xmlns:ma14="http://schemas.microsoft.com/office/mac/drawingml/2011/main" val="1"/>
             </a:ext>
           </a:extLst>
         </p:spPr>
@@ -7601,7 +7601,7 @@
           </a:ln>
           <a:extLst>
             <a:ext uri="{C572A759-6A51-4108-AA02-DFA0A04FC94B}">
-              <ma14:wrappingTextBoxFlag xmlns:ma14="http://schemas.microsoft.com/office/mac/drawingml/2011/main" xmlns:a14="http://schemas.microsoft.com/office/drawing/2010/main" xmlns:m="http://schemas.openxmlformats.org/officeDocument/2006/math" xmlns="" val="1"/>
+              <ma14:wrappingTextBoxFlag xmlns="" xmlns:m="http://schemas.openxmlformats.org/officeDocument/2006/math" xmlns:a14="http://schemas.microsoft.com/office/drawing/2010/main" xmlns:ma14="http://schemas.microsoft.com/office/mac/drawingml/2011/main" val="1"/>
             </a:ext>
           </a:extLst>
         </p:spPr>
@@ -7749,7 +7749,7 @@
           </a:ln>
           <a:extLst>
             <a:ext uri="{C572A759-6A51-4108-AA02-DFA0A04FC94B}">
-              <ma14:wrappingTextBoxFlag xmlns:ma14="http://schemas.microsoft.com/office/mac/drawingml/2011/main" xmlns:a14="http://schemas.microsoft.com/office/drawing/2010/main" xmlns:m="http://schemas.openxmlformats.org/officeDocument/2006/math" xmlns="" val="1"/>
+              <ma14:wrappingTextBoxFlag xmlns="" xmlns:m="http://schemas.openxmlformats.org/officeDocument/2006/math" xmlns:a14="http://schemas.microsoft.com/office/drawing/2010/main" xmlns:ma14="http://schemas.microsoft.com/office/mac/drawingml/2011/main" val="1"/>
             </a:ext>
           </a:extLst>
         </p:spPr>
@@ -7865,7 +7865,7 @@
           </a:ln>
           <a:extLst>
             <a:ext uri="{C572A759-6A51-4108-AA02-DFA0A04FC94B}">
-              <ma14:wrappingTextBoxFlag xmlns:ma14="http://schemas.microsoft.com/office/mac/drawingml/2011/main" xmlns:a14="http://schemas.microsoft.com/office/drawing/2010/main" xmlns:m="http://schemas.openxmlformats.org/officeDocument/2006/math" xmlns="" val="1"/>
+              <ma14:wrappingTextBoxFlag xmlns="" xmlns:m="http://schemas.openxmlformats.org/officeDocument/2006/math" xmlns:a14="http://schemas.microsoft.com/office/drawing/2010/main" xmlns:ma14="http://schemas.microsoft.com/office/mac/drawingml/2011/main" val="1"/>
             </a:ext>
           </a:extLst>
         </p:spPr>
@@ -7902,7 +7902,7 @@
           </a:ln>
           <a:extLst>
             <a:ext uri="{C572A759-6A51-4108-AA02-DFA0A04FC94B}">
-              <ma14:wrappingTextBoxFlag xmlns:ma14="http://schemas.microsoft.com/office/mac/drawingml/2011/main" xmlns:a14="http://schemas.microsoft.com/office/drawing/2010/main" xmlns:m="http://schemas.openxmlformats.org/officeDocument/2006/math" xmlns="" val="1"/>
+              <ma14:wrappingTextBoxFlag xmlns="" xmlns:m="http://schemas.openxmlformats.org/officeDocument/2006/math" xmlns:a14="http://schemas.microsoft.com/office/drawing/2010/main" xmlns:ma14="http://schemas.microsoft.com/office/mac/drawingml/2011/main" val="1"/>
             </a:ext>
           </a:extLst>
         </p:spPr>
@@ -8130,7 +8130,7 @@
           </a:ln>
           <a:extLst>
             <a:ext uri="{C572A759-6A51-4108-AA02-DFA0A04FC94B}">
-              <ma14:wrappingTextBoxFlag xmlns:ma14="http://schemas.microsoft.com/office/mac/drawingml/2011/main" xmlns:a14="http://schemas.microsoft.com/office/drawing/2010/main" xmlns:m="http://schemas.openxmlformats.org/officeDocument/2006/math" xmlns="" val="1"/>
+              <ma14:wrappingTextBoxFlag xmlns="" xmlns:m="http://schemas.openxmlformats.org/officeDocument/2006/math" xmlns:a14="http://schemas.microsoft.com/office/drawing/2010/main" xmlns:ma14="http://schemas.microsoft.com/office/mac/drawingml/2011/main" val="1"/>
             </a:ext>
           </a:extLst>
         </p:spPr>
@@ -8167,7 +8167,7 @@
           </a:ln>
           <a:extLst>
             <a:ext uri="{C572A759-6A51-4108-AA02-DFA0A04FC94B}">
-              <ma14:wrappingTextBoxFlag xmlns:ma14="http://schemas.microsoft.com/office/mac/drawingml/2011/main" xmlns:a14="http://schemas.microsoft.com/office/drawing/2010/main" xmlns:m="http://schemas.openxmlformats.org/officeDocument/2006/math" xmlns="" val="1"/>
+              <ma14:wrappingTextBoxFlag xmlns="" xmlns:m="http://schemas.openxmlformats.org/officeDocument/2006/math" xmlns:a14="http://schemas.microsoft.com/office/drawing/2010/main" xmlns:ma14="http://schemas.microsoft.com/office/mac/drawingml/2011/main" val="1"/>
             </a:ext>
           </a:extLst>
         </p:spPr>
@@ -8365,7 +8365,7 @@
           </a:ln>
           <a:extLst>
             <a:ext uri="{C572A759-6A51-4108-AA02-DFA0A04FC94B}">
-              <ma14:wrappingTextBoxFlag xmlns:ma14="http://schemas.microsoft.com/office/mac/drawingml/2011/main" xmlns:a14="http://schemas.microsoft.com/office/drawing/2010/main" xmlns:m="http://schemas.openxmlformats.org/officeDocument/2006/math" xmlns="" val="1"/>
+              <ma14:wrappingTextBoxFlag xmlns="" xmlns:m="http://schemas.openxmlformats.org/officeDocument/2006/math" xmlns:a14="http://schemas.microsoft.com/office/drawing/2010/main" xmlns:ma14="http://schemas.microsoft.com/office/mac/drawingml/2011/main" val="1"/>
             </a:ext>
           </a:extLst>
         </p:spPr>
@@ -8402,7 +8402,7 @@
           </a:ln>
           <a:extLst>
             <a:ext uri="{C572A759-6A51-4108-AA02-DFA0A04FC94B}">
-              <ma14:wrappingTextBoxFlag xmlns:ma14="http://schemas.microsoft.com/office/mac/drawingml/2011/main" xmlns:a14="http://schemas.microsoft.com/office/drawing/2010/main" xmlns:m="http://schemas.openxmlformats.org/officeDocument/2006/math" xmlns="" val="1"/>
+              <ma14:wrappingTextBoxFlag xmlns="" xmlns:m="http://schemas.openxmlformats.org/officeDocument/2006/math" xmlns:a14="http://schemas.microsoft.com/office/drawing/2010/main" xmlns:ma14="http://schemas.microsoft.com/office/mac/drawingml/2011/main" val="1"/>
             </a:ext>
           </a:extLst>
         </p:spPr>
@@ -8532,7 +8532,7 @@
           </a:ln>
           <a:extLst>
             <a:ext uri="{C572A759-6A51-4108-AA02-DFA0A04FC94B}">
-              <ma14:wrappingTextBoxFlag xmlns:ma14="http://schemas.microsoft.com/office/mac/drawingml/2011/main" xmlns:a14="http://schemas.microsoft.com/office/drawing/2010/main" xmlns:m="http://schemas.openxmlformats.org/officeDocument/2006/math" xmlns="" val="1"/>
+              <ma14:wrappingTextBoxFlag xmlns="" xmlns:m="http://schemas.openxmlformats.org/officeDocument/2006/math" xmlns:a14="http://schemas.microsoft.com/office/drawing/2010/main" xmlns:ma14="http://schemas.microsoft.com/office/mac/drawingml/2011/main" val="1"/>
             </a:ext>
           </a:extLst>
         </p:spPr>
@@ -8648,7 +8648,7 @@
           </a:ln>
           <a:extLst>
             <a:ext uri="{C572A759-6A51-4108-AA02-DFA0A04FC94B}">
-              <ma14:wrappingTextBoxFlag xmlns:ma14="http://schemas.microsoft.com/office/mac/drawingml/2011/main" xmlns:a14="http://schemas.microsoft.com/office/drawing/2010/main" xmlns:m="http://schemas.openxmlformats.org/officeDocument/2006/math" xmlns="" val="1"/>
+              <ma14:wrappingTextBoxFlag xmlns="" xmlns:m="http://schemas.openxmlformats.org/officeDocument/2006/math" xmlns:a14="http://schemas.microsoft.com/office/drawing/2010/main" xmlns:ma14="http://schemas.microsoft.com/office/mac/drawingml/2011/main" val="1"/>
             </a:ext>
           </a:extLst>
         </p:spPr>
@@ -8685,7 +8685,7 @@
           </a:ln>
           <a:extLst>
             <a:ext uri="{C572A759-6A51-4108-AA02-DFA0A04FC94B}">
-              <ma14:wrappingTextBoxFlag xmlns:ma14="http://schemas.microsoft.com/office/mac/drawingml/2011/main" xmlns:a14="http://schemas.microsoft.com/office/drawing/2010/main" xmlns:m="http://schemas.openxmlformats.org/officeDocument/2006/math" xmlns="" val="1"/>
+              <ma14:wrappingTextBoxFlag xmlns="" xmlns:m="http://schemas.openxmlformats.org/officeDocument/2006/math" xmlns:a14="http://schemas.microsoft.com/office/drawing/2010/main" xmlns:ma14="http://schemas.microsoft.com/office/mac/drawingml/2011/main" val="1"/>
             </a:ext>
           </a:extLst>
         </p:spPr>
@@ -8865,7 +8865,7 @@
           </a:ln>
           <a:extLst>
             <a:ext uri="{C572A759-6A51-4108-AA02-DFA0A04FC94B}">
-              <ma14:wrappingTextBoxFlag xmlns:ma14="http://schemas.microsoft.com/office/mac/drawingml/2011/main" xmlns:a14="http://schemas.microsoft.com/office/drawing/2010/main" xmlns:m="http://schemas.openxmlformats.org/officeDocument/2006/math" xmlns="" val="1"/>
+              <ma14:wrappingTextBoxFlag xmlns="" xmlns:m="http://schemas.openxmlformats.org/officeDocument/2006/math" xmlns:a14="http://schemas.microsoft.com/office/drawing/2010/main" xmlns:ma14="http://schemas.microsoft.com/office/mac/drawingml/2011/main" val="1"/>
             </a:ext>
           </a:extLst>
         </p:spPr>
@@ -8902,7 +8902,7 @@
           </a:ln>
           <a:extLst>
             <a:ext uri="{C572A759-6A51-4108-AA02-DFA0A04FC94B}">
-              <ma14:wrappingTextBoxFlag xmlns:ma14="http://schemas.microsoft.com/office/mac/drawingml/2011/main" xmlns:a14="http://schemas.microsoft.com/office/drawing/2010/main" xmlns:m="http://schemas.openxmlformats.org/officeDocument/2006/math" xmlns="" val="1"/>
+              <ma14:wrappingTextBoxFlag xmlns="" xmlns:m="http://schemas.openxmlformats.org/officeDocument/2006/math" xmlns:a14="http://schemas.microsoft.com/office/drawing/2010/main" xmlns:ma14="http://schemas.microsoft.com/office/mac/drawingml/2011/main" val="1"/>
             </a:ext>
           </a:extLst>
         </p:spPr>
@@ -9082,7 +9082,7 @@
           </a:ln>
           <a:extLst>
             <a:ext uri="{C572A759-6A51-4108-AA02-DFA0A04FC94B}">
-              <ma14:wrappingTextBoxFlag xmlns:ma14="http://schemas.microsoft.com/office/mac/drawingml/2011/main" xmlns:a14="http://schemas.microsoft.com/office/drawing/2010/main" xmlns:m="http://schemas.openxmlformats.org/officeDocument/2006/math" xmlns="" val="1"/>
+              <ma14:wrappingTextBoxFlag xmlns="" xmlns:m="http://schemas.openxmlformats.org/officeDocument/2006/math" xmlns:a14="http://schemas.microsoft.com/office/drawing/2010/main" xmlns:ma14="http://schemas.microsoft.com/office/mac/drawingml/2011/main" val="1"/>
             </a:ext>
           </a:extLst>
         </p:spPr>
@@ -9119,7 +9119,7 @@
           </a:ln>
           <a:extLst>
             <a:ext uri="{C572A759-6A51-4108-AA02-DFA0A04FC94B}">
-              <ma14:wrappingTextBoxFlag xmlns:ma14="http://schemas.microsoft.com/office/mac/drawingml/2011/main" xmlns:a14="http://schemas.microsoft.com/office/drawing/2010/main" xmlns:m="http://schemas.openxmlformats.org/officeDocument/2006/math" xmlns="" val="1"/>
+              <ma14:wrappingTextBoxFlag xmlns="" xmlns:m="http://schemas.openxmlformats.org/officeDocument/2006/math" xmlns:a14="http://schemas.microsoft.com/office/drawing/2010/main" xmlns:ma14="http://schemas.microsoft.com/office/mac/drawingml/2011/main" val="1"/>
             </a:ext>
           </a:extLst>
         </p:spPr>
@@ -9316,7 +9316,7 @@
           </a:ln>
           <a:extLst>
             <a:ext uri="{C572A759-6A51-4108-AA02-DFA0A04FC94B}">
-              <ma14:wrappingTextBoxFlag xmlns:ma14="http://schemas.microsoft.com/office/mac/drawingml/2011/main" xmlns:a14="http://schemas.microsoft.com/office/drawing/2010/main" xmlns:m="http://schemas.openxmlformats.org/officeDocument/2006/math" xmlns="" val="1"/>
+              <ma14:wrappingTextBoxFlag xmlns="" xmlns:m="http://schemas.openxmlformats.org/officeDocument/2006/math" xmlns:a14="http://schemas.microsoft.com/office/drawing/2010/main" xmlns:ma14="http://schemas.microsoft.com/office/mac/drawingml/2011/main" val="1"/>
             </a:ext>
           </a:extLst>
         </p:spPr>
@@ -9353,7 +9353,7 @@
           </a:ln>
           <a:extLst>
             <a:ext uri="{C572A759-6A51-4108-AA02-DFA0A04FC94B}">
-              <ma14:wrappingTextBoxFlag xmlns:ma14="http://schemas.microsoft.com/office/mac/drawingml/2011/main" xmlns:a14="http://schemas.microsoft.com/office/drawing/2010/main" xmlns:m="http://schemas.openxmlformats.org/officeDocument/2006/math" xmlns="" val="1"/>
+              <ma14:wrappingTextBoxFlag xmlns="" xmlns:m="http://schemas.openxmlformats.org/officeDocument/2006/math" xmlns:a14="http://schemas.microsoft.com/office/drawing/2010/main" xmlns:ma14="http://schemas.microsoft.com/office/mac/drawingml/2011/main" val="1"/>
             </a:ext>
           </a:extLst>
         </p:spPr>
@@ -9583,7 +9583,7 @@
           </a:ln>
           <a:extLst>
             <a:ext uri="{C572A759-6A51-4108-AA02-DFA0A04FC94B}">
-              <ma14:wrappingTextBoxFlag xmlns:ma14="http://schemas.microsoft.com/office/mac/drawingml/2011/main" xmlns:a14="http://schemas.microsoft.com/office/drawing/2010/main" xmlns:m="http://schemas.openxmlformats.org/officeDocument/2006/math" xmlns="" val="1"/>
+              <ma14:wrappingTextBoxFlag xmlns="" xmlns:m="http://schemas.openxmlformats.org/officeDocument/2006/math" xmlns:a14="http://schemas.microsoft.com/office/drawing/2010/main" xmlns:ma14="http://schemas.microsoft.com/office/mac/drawingml/2011/main" val="1"/>
             </a:ext>
           </a:extLst>
         </p:spPr>
@@ -9620,7 +9620,7 @@
           </a:ln>
           <a:extLst>
             <a:ext uri="{C572A759-6A51-4108-AA02-DFA0A04FC94B}">
-              <ma14:wrappingTextBoxFlag xmlns:ma14="http://schemas.microsoft.com/office/mac/drawingml/2011/main" xmlns:a14="http://schemas.microsoft.com/office/drawing/2010/main" xmlns:m="http://schemas.openxmlformats.org/officeDocument/2006/math" xmlns="" val="1"/>
+              <ma14:wrappingTextBoxFlag xmlns="" xmlns:m="http://schemas.openxmlformats.org/officeDocument/2006/math" xmlns:a14="http://schemas.microsoft.com/office/drawing/2010/main" xmlns:ma14="http://schemas.microsoft.com/office/mac/drawingml/2011/main" val="1"/>
             </a:ext>
           </a:extLst>
         </p:spPr>
@@ -10167,7 +10167,7 @@
           </a:ln>
           <a:extLst>
             <a:ext uri="{C572A759-6A51-4108-AA02-DFA0A04FC94B}">
-              <ma14:wrappingTextBoxFlag xmlns:ma14="http://schemas.microsoft.com/office/mac/drawingml/2011/main" xmlns:a14="http://schemas.microsoft.com/office/drawing/2010/main" xmlns:m="http://schemas.openxmlformats.org/officeDocument/2006/math" xmlns="" val="1"/>
+              <ma14:wrappingTextBoxFlag xmlns="" xmlns:m="http://schemas.openxmlformats.org/officeDocument/2006/math" xmlns:a14="http://schemas.microsoft.com/office/drawing/2010/main" xmlns:ma14="http://schemas.microsoft.com/office/mac/drawingml/2011/main" val="1"/>
             </a:ext>
           </a:extLst>
         </p:spPr>
@@ -10204,7 +10204,7 @@
           </a:ln>
           <a:extLst>
             <a:ext uri="{C572A759-6A51-4108-AA02-DFA0A04FC94B}">
-              <ma14:wrappingTextBoxFlag xmlns:ma14="http://schemas.microsoft.com/office/mac/drawingml/2011/main" xmlns:a14="http://schemas.microsoft.com/office/drawing/2010/main" xmlns:m="http://schemas.openxmlformats.org/officeDocument/2006/math" xmlns="" val="1"/>
+              <ma14:wrappingTextBoxFlag xmlns="" xmlns:m="http://schemas.openxmlformats.org/officeDocument/2006/math" xmlns:a14="http://schemas.microsoft.com/office/drawing/2010/main" xmlns:ma14="http://schemas.microsoft.com/office/mac/drawingml/2011/main" val="1"/>
             </a:ext>
           </a:extLst>
         </p:spPr>
@@ -10432,7 +10432,7 @@
           </a:ln>
           <a:extLst>
             <a:ext uri="{C572A759-6A51-4108-AA02-DFA0A04FC94B}">
-              <ma14:wrappingTextBoxFlag xmlns:ma14="http://schemas.microsoft.com/office/mac/drawingml/2011/main" xmlns:a14="http://schemas.microsoft.com/office/drawing/2010/main" xmlns:m="http://schemas.openxmlformats.org/officeDocument/2006/math" xmlns="" val="1"/>
+              <ma14:wrappingTextBoxFlag xmlns="" xmlns:m="http://schemas.openxmlformats.org/officeDocument/2006/math" xmlns:a14="http://schemas.microsoft.com/office/drawing/2010/main" xmlns:ma14="http://schemas.microsoft.com/office/mac/drawingml/2011/main" val="1"/>
             </a:ext>
           </a:extLst>
         </p:spPr>
@@ -10469,7 +10469,7 @@
           </a:ln>
           <a:extLst>
             <a:ext uri="{C572A759-6A51-4108-AA02-DFA0A04FC94B}">
-              <ma14:wrappingTextBoxFlag xmlns:ma14="http://schemas.microsoft.com/office/mac/drawingml/2011/main" xmlns:a14="http://schemas.microsoft.com/office/drawing/2010/main" xmlns:m="http://schemas.openxmlformats.org/officeDocument/2006/math" xmlns="" val="1"/>
+              <ma14:wrappingTextBoxFlag xmlns="" xmlns:m="http://schemas.openxmlformats.org/officeDocument/2006/math" xmlns:a14="http://schemas.microsoft.com/office/drawing/2010/main" xmlns:ma14="http://schemas.microsoft.com/office/mac/drawingml/2011/main" val="1"/>
             </a:ext>
           </a:extLst>
         </p:spPr>
@@ -10670,7 +10670,7 @@
           </a:ln>
           <a:extLst>
             <a:ext uri="{C572A759-6A51-4108-AA02-DFA0A04FC94B}">
-              <ma14:wrappingTextBoxFlag xmlns:ma14="http://schemas.microsoft.com/office/mac/drawingml/2011/main" xmlns:a14="http://schemas.microsoft.com/office/drawing/2010/main" xmlns:m="http://schemas.openxmlformats.org/officeDocument/2006/math" xmlns="" val="1"/>
+              <ma14:wrappingTextBoxFlag xmlns="" xmlns:m="http://schemas.openxmlformats.org/officeDocument/2006/math" xmlns:a14="http://schemas.microsoft.com/office/drawing/2010/main" xmlns:ma14="http://schemas.microsoft.com/office/mac/drawingml/2011/main" val="1"/>
             </a:ext>
           </a:extLst>
         </p:spPr>
@@ -10707,7 +10707,7 @@
           </a:ln>
           <a:extLst>
             <a:ext uri="{C572A759-6A51-4108-AA02-DFA0A04FC94B}">
-              <ma14:wrappingTextBoxFlag xmlns:ma14="http://schemas.microsoft.com/office/mac/drawingml/2011/main" xmlns:a14="http://schemas.microsoft.com/office/drawing/2010/main" xmlns:m="http://schemas.openxmlformats.org/officeDocument/2006/math" xmlns="" val="1"/>
+              <ma14:wrappingTextBoxFlag xmlns="" xmlns:m="http://schemas.openxmlformats.org/officeDocument/2006/math" xmlns:a14="http://schemas.microsoft.com/office/drawing/2010/main" xmlns:ma14="http://schemas.microsoft.com/office/mac/drawingml/2011/main" val="1"/>
             </a:ext>
           </a:extLst>
         </p:spPr>
@@ -10887,7 +10887,7 @@
           </a:ln>
           <a:extLst>
             <a:ext uri="{C572A759-6A51-4108-AA02-DFA0A04FC94B}">
-              <ma14:wrappingTextBoxFlag xmlns:ma14="http://schemas.microsoft.com/office/mac/drawingml/2011/main" xmlns:a14="http://schemas.microsoft.com/office/drawing/2010/main" xmlns:m="http://schemas.openxmlformats.org/officeDocument/2006/math" xmlns="" val="1"/>
+              <ma14:wrappingTextBoxFlag xmlns="" xmlns:m="http://schemas.openxmlformats.org/officeDocument/2006/math" xmlns:a14="http://schemas.microsoft.com/office/drawing/2010/main" xmlns:ma14="http://schemas.microsoft.com/office/mac/drawingml/2011/main" val="1"/>
             </a:ext>
           </a:extLst>
         </p:spPr>
@@ -10924,7 +10924,7 @@
           </a:ln>
           <a:extLst>
             <a:ext uri="{C572A759-6A51-4108-AA02-DFA0A04FC94B}">
-              <ma14:wrappingTextBoxFlag xmlns:ma14="http://schemas.microsoft.com/office/mac/drawingml/2011/main" xmlns:a14="http://schemas.microsoft.com/office/drawing/2010/main" xmlns:m="http://schemas.openxmlformats.org/officeDocument/2006/math" xmlns="" val="1"/>
+              <ma14:wrappingTextBoxFlag xmlns="" xmlns:m="http://schemas.openxmlformats.org/officeDocument/2006/math" xmlns:a14="http://schemas.microsoft.com/office/drawing/2010/main" xmlns:ma14="http://schemas.microsoft.com/office/mac/drawingml/2011/main" val="1"/>
             </a:ext>
           </a:extLst>
         </p:spPr>
@@ -11104,7 +11104,7 @@
           </a:ln>
           <a:extLst>
             <a:ext uri="{C572A759-6A51-4108-AA02-DFA0A04FC94B}">
-              <ma14:wrappingTextBoxFlag xmlns:ma14="http://schemas.microsoft.com/office/mac/drawingml/2011/main" xmlns:a14="http://schemas.microsoft.com/office/drawing/2010/main" xmlns:m="http://schemas.openxmlformats.org/officeDocument/2006/math" xmlns="" val="1"/>
+              <ma14:wrappingTextBoxFlag xmlns="" xmlns:m="http://schemas.openxmlformats.org/officeDocument/2006/math" xmlns:a14="http://schemas.microsoft.com/office/drawing/2010/main" xmlns:ma14="http://schemas.microsoft.com/office/mac/drawingml/2011/main" val="1"/>
             </a:ext>
           </a:extLst>
         </p:spPr>
@@ -11141,7 +11141,7 @@
           </a:ln>
           <a:extLst>
             <a:ext uri="{C572A759-6A51-4108-AA02-DFA0A04FC94B}">
-              <ma14:wrappingTextBoxFlag xmlns:ma14="http://schemas.microsoft.com/office/mac/drawingml/2011/main" xmlns:a14="http://schemas.microsoft.com/office/drawing/2010/main" xmlns:m="http://schemas.openxmlformats.org/officeDocument/2006/math" xmlns="" val="1"/>
+              <ma14:wrappingTextBoxFlag xmlns="" xmlns:m="http://schemas.openxmlformats.org/officeDocument/2006/math" xmlns:a14="http://schemas.microsoft.com/office/drawing/2010/main" xmlns:ma14="http://schemas.microsoft.com/office/mac/drawingml/2011/main" val="1"/>
             </a:ext>
           </a:extLst>
         </p:spPr>
@@ -11294,7 +11294,7 @@
           </a:ln>
           <a:extLst>
             <a:ext uri="{C572A759-6A51-4108-AA02-DFA0A04FC94B}">
-              <ma14:wrappingTextBoxFlag xmlns:ma14="http://schemas.microsoft.com/office/mac/drawingml/2011/main" xmlns:a14="http://schemas.microsoft.com/office/drawing/2010/main" xmlns:m="http://schemas.openxmlformats.org/officeDocument/2006/math" xmlns="" val="1"/>
+              <ma14:wrappingTextBoxFlag xmlns="" xmlns:m="http://schemas.openxmlformats.org/officeDocument/2006/math" xmlns:a14="http://schemas.microsoft.com/office/drawing/2010/main" xmlns:ma14="http://schemas.microsoft.com/office/mac/drawingml/2011/main" val="1"/>
             </a:ext>
           </a:extLst>
         </p:spPr>
@@ -11331,7 +11331,7 @@
           </a:ln>
           <a:extLst>
             <a:ext uri="{C572A759-6A51-4108-AA02-DFA0A04FC94B}">
-              <ma14:wrappingTextBoxFlag xmlns:ma14="http://schemas.microsoft.com/office/mac/drawingml/2011/main" xmlns:a14="http://schemas.microsoft.com/office/drawing/2010/main" xmlns:m="http://schemas.openxmlformats.org/officeDocument/2006/math" xmlns="" val="1"/>
+              <ma14:wrappingTextBoxFlag xmlns="" xmlns:m="http://schemas.openxmlformats.org/officeDocument/2006/math" xmlns:a14="http://schemas.microsoft.com/office/drawing/2010/main" xmlns:ma14="http://schemas.microsoft.com/office/mac/drawingml/2011/main" val="1"/>
             </a:ext>
           </a:extLst>
         </p:spPr>
@@ -11536,7 +11536,7 @@
           </a:ln>
           <a:extLst>
             <a:ext uri="{C572A759-6A51-4108-AA02-DFA0A04FC94B}">
-              <ma14:wrappingTextBoxFlag xmlns:ma14="http://schemas.microsoft.com/office/mac/drawingml/2011/main" xmlns:a14="http://schemas.microsoft.com/office/drawing/2010/main" xmlns:m="http://schemas.openxmlformats.org/officeDocument/2006/math" xmlns="" val="1"/>
+              <ma14:wrappingTextBoxFlag xmlns="" xmlns:m="http://schemas.openxmlformats.org/officeDocument/2006/math" xmlns:a14="http://schemas.microsoft.com/office/drawing/2010/main" xmlns:ma14="http://schemas.microsoft.com/office/mac/drawingml/2011/main" val="1"/>
             </a:ext>
           </a:extLst>
         </p:spPr>
@@ -11573,7 +11573,7 @@
           </a:ln>
           <a:extLst>
             <a:ext uri="{C572A759-6A51-4108-AA02-DFA0A04FC94B}">
-              <ma14:wrappingTextBoxFlag xmlns:ma14="http://schemas.microsoft.com/office/mac/drawingml/2011/main" xmlns:a14="http://schemas.microsoft.com/office/drawing/2010/main" xmlns:m="http://schemas.openxmlformats.org/officeDocument/2006/math" xmlns="" val="1"/>
+              <ma14:wrappingTextBoxFlag xmlns="" xmlns:m="http://schemas.openxmlformats.org/officeDocument/2006/math" xmlns:a14="http://schemas.microsoft.com/office/drawing/2010/main" xmlns:ma14="http://schemas.microsoft.com/office/mac/drawingml/2011/main" val="1"/>
             </a:ext>
           </a:extLst>
         </p:spPr>
@@ -11726,7 +11726,7 @@
           </a:ln>
           <a:extLst>
             <a:ext uri="{C572A759-6A51-4108-AA02-DFA0A04FC94B}">
-              <ma14:wrappingTextBoxFlag xmlns:ma14="http://schemas.microsoft.com/office/mac/drawingml/2011/main" xmlns:a14="http://schemas.microsoft.com/office/drawing/2010/main" xmlns:m="http://schemas.openxmlformats.org/officeDocument/2006/math" xmlns="" val="1"/>
+              <ma14:wrappingTextBoxFlag xmlns="" xmlns:m="http://schemas.openxmlformats.org/officeDocument/2006/math" xmlns:a14="http://schemas.microsoft.com/office/drawing/2010/main" xmlns:ma14="http://schemas.microsoft.com/office/mac/drawingml/2011/main" val="1"/>
             </a:ext>
           </a:extLst>
         </p:spPr>
@@ -11763,7 +11763,7 @@
           </a:ln>
           <a:extLst>
             <a:ext uri="{C572A759-6A51-4108-AA02-DFA0A04FC94B}">
-              <ma14:wrappingTextBoxFlag xmlns:ma14="http://schemas.microsoft.com/office/mac/drawingml/2011/main" xmlns:a14="http://schemas.microsoft.com/office/drawing/2010/main" xmlns:m="http://schemas.openxmlformats.org/officeDocument/2006/math" xmlns="" val="1"/>
+              <ma14:wrappingTextBoxFlag xmlns="" xmlns:m="http://schemas.openxmlformats.org/officeDocument/2006/math" xmlns:a14="http://schemas.microsoft.com/office/drawing/2010/main" xmlns:ma14="http://schemas.microsoft.com/office/mac/drawingml/2011/main" val="1"/>
             </a:ext>
           </a:extLst>
         </p:spPr>
@@ -11905,7 +11905,7 @@
           </a:ln>
           <a:extLst>
             <a:ext uri="{C572A759-6A51-4108-AA02-DFA0A04FC94B}">
-              <ma14:wrappingTextBoxFlag xmlns:ma14="http://schemas.microsoft.com/office/mac/drawingml/2011/main" xmlns:a14="http://schemas.microsoft.com/office/drawing/2010/main" xmlns:m="http://schemas.openxmlformats.org/officeDocument/2006/math" xmlns="" val="1"/>
+              <ma14:wrappingTextBoxFlag xmlns="" xmlns:m="http://schemas.openxmlformats.org/officeDocument/2006/math" xmlns:a14="http://schemas.microsoft.com/office/drawing/2010/main" xmlns:ma14="http://schemas.microsoft.com/office/mac/drawingml/2011/main" val="1"/>
             </a:ext>
           </a:extLst>
         </p:spPr>
@@ -12021,7 +12021,7 @@
           </a:ln>
           <a:extLst>
             <a:ext uri="{C572A759-6A51-4108-AA02-DFA0A04FC94B}">
-              <ma14:wrappingTextBoxFlag xmlns:ma14="http://schemas.microsoft.com/office/mac/drawingml/2011/main" xmlns:a14="http://schemas.microsoft.com/office/drawing/2010/main" xmlns:m="http://schemas.openxmlformats.org/officeDocument/2006/math" xmlns="" val="1"/>
+              <ma14:wrappingTextBoxFlag xmlns="" xmlns:m="http://schemas.openxmlformats.org/officeDocument/2006/math" xmlns:a14="http://schemas.microsoft.com/office/drawing/2010/main" xmlns:ma14="http://schemas.microsoft.com/office/mac/drawingml/2011/main" val="1"/>
             </a:ext>
           </a:extLst>
         </p:spPr>
@@ -12058,7 +12058,7 @@
           </a:ln>
           <a:extLst>
             <a:ext uri="{C572A759-6A51-4108-AA02-DFA0A04FC94B}">
-              <ma14:wrappingTextBoxFlag xmlns:ma14="http://schemas.microsoft.com/office/mac/drawingml/2011/main" xmlns:a14="http://schemas.microsoft.com/office/drawing/2010/main" xmlns:m="http://schemas.openxmlformats.org/officeDocument/2006/math" xmlns="" val="1"/>
+              <ma14:wrappingTextBoxFlag xmlns="" xmlns:m="http://schemas.openxmlformats.org/officeDocument/2006/math" xmlns:a14="http://schemas.microsoft.com/office/drawing/2010/main" xmlns:ma14="http://schemas.microsoft.com/office/mac/drawingml/2011/main" val="1"/>
             </a:ext>
           </a:extLst>
         </p:spPr>
@@ -12542,7 +12542,7 @@
           </a:ln>
           <a:extLst>
             <a:ext uri="{C572A759-6A51-4108-AA02-DFA0A04FC94B}">
-              <ma14:wrappingTextBoxFlag xmlns:ma14="http://schemas.microsoft.com/office/mac/drawingml/2011/main" xmlns:a14="http://schemas.microsoft.com/office/drawing/2010/main" xmlns:m="http://schemas.openxmlformats.org/officeDocument/2006/math" xmlns="" val="1"/>
+              <ma14:wrappingTextBoxFlag xmlns="" xmlns:m="http://schemas.openxmlformats.org/officeDocument/2006/math" xmlns:a14="http://schemas.microsoft.com/office/drawing/2010/main" xmlns:ma14="http://schemas.microsoft.com/office/mac/drawingml/2011/main" val="1"/>
             </a:ext>
           </a:extLst>
         </p:spPr>
@@ -12579,7 +12579,7 @@
           </a:ln>
           <a:extLst>
             <a:ext uri="{C572A759-6A51-4108-AA02-DFA0A04FC94B}">
-              <ma14:wrappingTextBoxFlag xmlns:ma14="http://schemas.microsoft.com/office/mac/drawingml/2011/main" xmlns:a14="http://schemas.microsoft.com/office/drawing/2010/main" xmlns:m="http://schemas.openxmlformats.org/officeDocument/2006/math" xmlns="" val="1"/>
+              <ma14:wrappingTextBoxFlag xmlns="" xmlns:m="http://schemas.openxmlformats.org/officeDocument/2006/math" xmlns:a14="http://schemas.microsoft.com/office/drawing/2010/main" xmlns:ma14="http://schemas.microsoft.com/office/mac/drawingml/2011/main" val="1"/>
             </a:ext>
           </a:extLst>
         </p:spPr>
@@ -12734,7 +12734,7 @@
           </a:ln>
           <a:extLst>
             <a:ext uri="{C572A759-6A51-4108-AA02-DFA0A04FC94B}">
-              <ma14:wrappingTextBoxFlag xmlns:ma14="http://schemas.microsoft.com/office/mac/drawingml/2011/main" xmlns:a14="http://schemas.microsoft.com/office/drawing/2010/main" xmlns:m="http://schemas.openxmlformats.org/officeDocument/2006/math" xmlns="" val="1"/>
+              <ma14:wrappingTextBoxFlag xmlns="" xmlns:m="http://schemas.openxmlformats.org/officeDocument/2006/math" xmlns:a14="http://schemas.microsoft.com/office/drawing/2010/main" xmlns:ma14="http://schemas.microsoft.com/office/mac/drawingml/2011/main" val="1"/>
             </a:ext>
           </a:extLst>
         </p:spPr>
@@ -12794,7 +12794,7 @@
           </a:ln>
           <a:extLst>
             <a:ext uri="{C572A759-6A51-4108-AA02-DFA0A04FC94B}">
-              <ma14:wrappingTextBoxFlag xmlns:ma14="http://schemas.microsoft.com/office/mac/drawingml/2011/main" xmlns:a14="http://schemas.microsoft.com/office/drawing/2010/main" xmlns:m="http://schemas.openxmlformats.org/officeDocument/2006/math" xmlns="" val="1"/>
+              <ma14:wrappingTextBoxFlag xmlns="" xmlns:m="http://schemas.openxmlformats.org/officeDocument/2006/math" xmlns:a14="http://schemas.microsoft.com/office/drawing/2010/main" xmlns:ma14="http://schemas.microsoft.com/office/mac/drawingml/2011/main" val="1"/>
             </a:ext>
           </a:extLst>
         </p:spPr>
@@ -12851,7 +12851,7 @@
           </a:ln>
           <a:extLst>
             <a:ext uri="{C572A759-6A51-4108-AA02-DFA0A04FC94B}">
-              <ma14:wrappingTextBoxFlag xmlns:ma14="http://schemas.microsoft.com/office/mac/drawingml/2011/main" xmlns:a14="http://schemas.microsoft.com/office/drawing/2010/main" xmlns:m="http://schemas.openxmlformats.org/officeDocument/2006/math" xmlns="" val="1"/>
+              <ma14:wrappingTextBoxFlag xmlns="" xmlns:m="http://schemas.openxmlformats.org/officeDocument/2006/math" xmlns:a14="http://schemas.microsoft.com/office/drawing/2010/main" xmlns:ma14="http://schemas.microsoft.com/office/mac/drawingml/2011/main" val="1"/>
             </a:ext>
           </a:extLst>
         </p:spPr>
@@ -13002,7 +13002,7 @@
           </a:ln>
           <a:extLst>
             <a:ext uri="{C572A759-6A51-4108-AA02-DFA0A04FC94B}">
-              <ma14:wrappingTextBoxFlag xmlns:ma14="http://schemas.microsoft.com/office/mac/drawingml/2011/main" xmlns:a14="http://schemas.microsoft.com/office/drawing/2010/main" xmlns:m="http://schemas.openxmlformats.org/officeDocument/2006/math" xmlns="" val="1"/>
+              <ma14:wrappingTextBoxFlag xmlns="" xmlns:m="http://schemas.openxmlformats.org/officeDocument/2006/math" xmlns:a14="http://schemas.microsoft.com/office/drawing/2010/main" xmlns:ma14="http://schemas.microsoft.com/office/mac/drawingml/2011/main" val="1"/>
             </a:ext>
           </a:extLst>
         </p:spPr>
@@ -13105,7 +13105,7 @@
           </a:ln>
           <a:extLst>
             <a:ext uri="{C572A759-6A51-4108-AA02-DFA0A04FC94B}">
-              <ma14:wrappingTextBoxFlag xmlns:ma14="http://schemas.microsoft.com/office/mac/drawingml/2011/main" xmlns:a14="http://schemas.microsoft.com/office/drawing/2010/main" xmlns:m="http://schemas.openxmlformats.org/officeDocument/2006/math" xmlns="" val="1"/>
+              <ma14:wrappingTextBoxFlag xmlns="" xmlns:m="http://schemas.openxmlformats.org/officeDocument/2006/math" xmlns:a14="http://schemas.microsoft.com/office/drawing/2010/main" xmlns:ma14="http://schemas.microsoft.com/office/mac/drawingml/2011/main" val="1"/>
             </a:ext>
           </a:extLst>
         </p:spPr>
@@ -13213,7 +13213,7 @@
           </a:ln>
           <a:extLst>
             <a:ext uri="{C572A759-6A51-4108-AA02-DFA0A04FC94B}">
-              <ma14:wrappingTextBoxFlag xmlns:ma14="http://schemas.microsoft.com/office/mac/drawingml/2011/main" xmlns:a14="http://schemas.microsoft.com/office/drawing/2010/main" xmlns:m="http://schemas.openxmlformats.org/officeDocument/2006/math" xmlns="" val="1"/>
+              <ma14:wrappingTextBoxFlag xmlns="" xmlns:m="http://schemas.openxmlformats.org/officeDocument/2006/math" xmlns:a14="http://schemas.microsoft.com/office/drawing/2010/main" xmlns:ma14="http://schemas.microsoft.com/office/mac/drawingml/2011/main" val="1"/>
             </a:ext>
           </a:extLst>
         </p:spPr>
@@ -13250,7 +13250,7 @@
           </a:ln>
           <a:extLst>
             <a:ext uri="{C572A759-6A51-4108-AA02-DFA0A04FC94B}">
-              <ma14:wrappingTextBoxFlag xmlns:ma14="http://schemas.microsoft.com/office/mac/drawingml/2011/main" xmlns:a14="http://schemas.microsoft.com/office/drawing/2010/main" xmlns:m="http://schemas.openxmlformats.org/officeDocument/2006/math" xmlns="" val="1"/>
+              <ma14:wrappingTextBoxFlag xmlns="" xmlns:m="http://schemas.openxmlformats.org/officeDocument/2006/math" xmlns:a14="http://schemas.microsoft.com/office/drawing/2010/main" xmlns:ma14="http://schemas.microsoft.com/office/mac/drawingml/2011/main" val="1"/>
             </a:ext>
           </a:extLst>
         </p:spPr>
@@ -13380,7 +13380,7 @@
           </a:ln>
           <a:extLst>
             <a:ext uri="{C572A759-6A51-4108-AA02-DFA0A04FC94B}">
-              <ma14:wrappingTextBoxFlag xmlns:ma14="http://schemas.microsoft.com/office/mac/drawingml/2011/main" xmlns:a14="http://schemas.microsoft.com/office/drawing/2010/main" xmlns:m="http://schemas.openxmlformats.org/officeDocument/2006/math" xmlns="" val="1"/>
+              <ma14:wrappingTextBoxFlag xmlns="" xmlns:m="http://schemas.openxmlformats.org/officeDocument/2006/math" xmlns:a14="http://schemas.microsoft.com/office/drawing/2010/main" xmlns:ma14="http://schemas.microsoft.com/office/mac/drawingml/2011/main" val="1"/>
             </a:ext>
           </a:extLst>
         </p:spPr>
@@ -13496,7 +13496,7 @@
           </a:ln>
           <a:extLst>
             <a:ext uri="{C572A759-6A51-4108-AA02-DFA0A04FC94B}">
-              <ma14:wrappingTextBoxFlag xmlns:ma14="http://schemas.microsoft.com/office/mac/drawingml/2011/main" xmlns:a14="http://schemas.microsoft.com/office/drawing/2010/main" xmlns:m="http://schemas.openxmlformats.org/officeDocument/2006/math" xmlns="" val="1"/>
+              <ma14:wrappingTextBoxFlag xmlns="" xmlns:m="http://schemas.openxmlformats.org/officeDocument/2006/math" xmlns:a14="http://schemas.microsoft.com/office/drawing/2010/main" xmlns:ma14="http://schemas.microsoft.com/office/mac/drawingml/2011/main" val="1"/>
             </a:ext>
           </a:extLst>
         </p:spPr>
@@ -13533,7 +13533,7 @@
           </a:ln>
           <a:extLst>
             <a:ext uri="{C572A759-6A51-4108-AA02-DFA0A04FC94B}">
-              <ma14:wrappingTextBoxFlag xmlns:ma14="http://schemas.microsoft.com/office/mac/drawingml/2011/main" xmlns:a14="http://schemas.microsoft.com/office/drawing/2010/main" xmlns:m="http://schemas.openxmlformats.org/officeDocument/2006/math" xmlns="" val="1"/>
+              <ma14:wrappingTextBoxFlag xmlns="" xmlns:m="http://schemas.openxmlformats.org/officeDocument/2006/math" xmlns:a14="http://schemas.microsoft.com/office/drawing/2010/main" xmlns:ma14="http://schemas.microsoft.com/office/mac/drawingml/2011/main" val="1"/>
             </a:ext>
           </a:extLst>
         </p:spPr>
@@ -13760,7 +13760,7 @@
           </a:ln>
           <a:extLst>
             <a:ext uri="{C572A759-6A51-4108-AA02-DFA0A04FC94B}">
-              <ma14:wrappingTextBoxFlag xmlns:ma14="http://schemas.microsoft.com/office/mac/drawingml/2011/main" xmlns:a14="http://schemas.microsoft.com/office/drawing/2010/main" xmlns:m="http://schemas.openxmlformats.org/officeDocument/2006/math" xmlns="" val="1"/>
+              <ma14:wrappingTextBoxFlag xmlns="" xmlns:m="http://schemas.openxmlformats.org/officeDocument/2006/math" xmlns:a14="http://schemas.microsoft.com/office/drawing/2010/main" xmlns:ma14="http://schemas.microsoft.com/office/mac/drawingml/2011/main" val="1"/>
             </a:ext>
           </a:extLst>
         </p:spPr>
@@ -13797,7 +13797,7 @@
           </a:ln>
           <a:extLst>
             <a:ext uri="{C572A759-6A51-4108-AA02-DFA0A04FC94B}">
-              <ma14:wrappingTextBoxFlag xmlns:ma14="http://schemas.microsoft.com/office/mac/drawingml/2011/main" xmlns:a14="http://schemas.microsoft.com/office/drawing/2010/main" xmlns:m="http://schemas.openxmlformats.org/officeDocument/2006/math" xmlns="" val="1"/>
+              <ma14:wrappingTextBoxFlag xmlns="" xmlns:m="http://schemas.openxmlformats.org/officeDocument/2006/math" xmlns:a14="http://schemas.microsoft.com/office/drawing/2010/main" xmlns:ma14="http://schemas.microsoft.com/office/mac/drawingml/2011/main" val="1"/>
             </a:ext>
           </a:extLst>
         </p:spPr>
@@ -14104,7 +14104,7 @@
           </a:ln>
           <a:extLst>
             <a:ext uri="{C572A759-6A51-4108-AA02-DFA0A04FC94B}">
-              <ma14:wrappingTextBoxFlag xmlns:ma14="http://schemas.microsoft.com/office/mac/drawingml/2011/main" xmlns:a14="http://schemas.microsoft.com/office/drawing/2010/main" xmlns:m="http://schemas.openxmlformats.org/officeDocument/2006/math" xmlns="" val="1"/>
+              <ma14:wrappingTextBoxFlag xmlns="" xmlns:m="http://schemas.openxmlformats.org/officeDocument/2006/math" xmlns:a14="http://schemas.microsoft.com/office/drawing/2010/main" xmlns:ma14="http://schemas.microsoft.com/office/mac/drawingml/2011/main" val="1"/>
             </a:ext>
           </a:extLst>
         </p:spPr>
@@ -14141,7 +14141,7 @@
           </a:ln>
           <a:extLst>
             <a:ext uri="{C572A759-6A51-4108-AA02-DFA0A04FC94B}">
-              <ma14:wrappingTextBoxFlag xmlns:ma14="http://schemas.microsoft.com/office/mac/drawingml/2011/main" xmlns:a14="http://schemas.microsoft.com/office/drawing/2010/main" xmlns:m="http://schemas.openxmlformats.org/officeDocument/2006/math" xmlns="" val="1"/>
+              <ma14:wrappingTextBoxFlag xmlns="" xmlns:m="http://schemas.openxmlformats.org/officeDocument/2006/math" xmlns:a14="http://schemas.microsoft.com/office/drawing/2010/main" xmlns:ma14="http://schemas.microsoft.com/office/mac/drawingml/2011/main" val="1"/>
             </a:ext>
           </a:extLst>
         </p:spPr>
@@ -14262,7 +14262,7 @@
           </a:ln>
           <a:extLst>
             <a:ext uri="{C572A759-6A51-4108-AA02-DFA0A04FC94B}">
-              <ma14:wrappingTextBoxFlag xmlns:ma14="http://schemas.microsoft.com/office/mac/drawingml/2011/main" xmlns:a14="http://schemas.microsoft.com/office/drawing/2010/main" xmlns:m="http://schemas.openxmlformats.org/officeDocument/2006/math" xmlns="" val="1"/>
+              <ma14:wrappingTextBoxFlag xmlns="" xmlns:m="http://schemas.openxmlformats.org/officeDocument/2006/math" xmlns:a14="http://schemas.microsoft.com/office/drawing/2010/main" xmlns:ma14="http://schemas.microsoft.com/office/mac/drawingml/2011/main" val="1"/>
             </a:ext>
           </a:extLst>
         </p:spPr>
@@ -14323,7 +14323,7 @@
           </a:ln>
           <a:extLst>
             <a:ext uri="{C572A759-6A51-4108-AA02-DFA0A04FC94B}">
-              <ma14:wrappingTextBoxFlag xmlns:ma14="http://schemas.microsoft.com/office/mac/drawingml/2011/main" xmlns:a14="http://schemas.microsoft.com/office/drawing/2010/main" xmlns:m="http://schemas.openxmlformats.org/officeDocument/2006/math" xmlns="" val="1"/>
+              <ma14:wrappingTextBoxFlag xmlns="" xmlns:m="http://schemas.openxmlformats.org/officeDocument/2006/math" xmlns:a14="http://schemas.microsoft.com/office/drawing/2010/main" xmlns:ma14="http://schemas.microsoft.com/office/mac/drawingml/2011/main" val="1"/>
             </a:ext>
           </a:extLst>
         </p:spPr>

</xml_diff>

<commit_message>
Fix typos on slide LinkedLists ProsCons (#17)
* Fix typos on slide LinkedLists ProsCons

* Fix typos on slide LinkedLists ProsCons for 2nd pptx of baseDS
</commit_message>
<xml_diff>
--- a/lections/4_data_structures_1.pptx
+++ b/lections/4_data_structures_1.pptx
@@ -2447,7 +2447,7 @@
           </a:ln>
           <a:extLst>
             <a:ext uri="{C572A759-6A51-4108-AA02-DFA0A04FC94B}">
-              <ma14:wrappingTextBoxFlag xmlns:ma14="http://schemas.microsoft.com/office/mac/drawingml/2011/main" xmlns:a14="http://schemas.microsoft.com/office/drawing/2010/main" xmlns:m="http://schemas.openxmlformats.org/officeDocument/2006/math" xmlns="" val="1"/>
+              <ma14:wrappingTextBoxFlag xmlns="" xmlns:m="http://schemas.openxmlformats.org/officeDocument/2006/math" xmlns:a14="http://schemas.microsoft.com/office/drawing/2010/main" xmlns:ma14="http://schemas.microsoft.com/office/mac/drawingml/2011/main" val="1"/>
             </a:ext>
           </a:extLst>
         </p:spPr>
@@ -2486,7 +2486,7 @@
           </a:ln>
           <a:extLst>
             <a:ext uri="{C572A759-6A51-4108-AA02-DFA0A04FC94B}">
-              <ma14:wrappingTextBoxFlag xmlns:ma14="http://schemas.microsoft.com/office/mac/drawingml/2011/main" xmlns:a14="http://schemas.microsoft.com/office/drawing/2010/main" xmlns:m="http://schemas.openxmlformats.org/officeDocument/2006/math" xmlns="" val="1"/>
+              <ma14:wrappingTextBoxFlag xmlns="" xmlns:m="http://schemas.openxmlformats.org/officeDocument/2006/math" xmlns:a14="http://schemas.microsoft.com/office/drawing/2010/main" xmlns:ma14="http://schemas.microsoft.com/office/mac/drawingml/2011/main" val="1"/>
             </a:ext>
           </a:extLst>
         </p:spPr>
@@ -3484,7 +3484,7 @@
           </a:ln>
           <a:extLst>
             <a:ext uri="{C572A759-6A51-4108-AA02-DFA0A04FC94B}">
-              <ma14:wrappingTextBoxFlag xmlns:ma14="http://schemas.microsoft.com/office/mac/drawingml/2011/main" xmlns:a14="http://schemas.microsoft.com/office/drawing/2010/main" xmlns:m="http://schemas.openxmlformats.org/officeDocument/2006/math" xmlns="" val="1"/>
+              <ma14:wrappingTextBoxFlag xmlns="" xmlns:m="http://schemas.openxmlformats.org/officeDocument/2006/math" xmlns:a14="http://schemas.microsoft.com/office/drawing/2010/main" xmlns:ma14="http://schemas.microsoft.com/office/mac/drawingml/2011/main" val="1"/>
             </a:ext>
           </a:extLst>
         </p:spPr>
@@ -3517,7 +3517,7 @@
           </a:ln>
           <a:extLst>
             <a:ext uri="{C572A759-6A51-4108-AA02-DFA0A04FC94B}">
-              <ma14:wrappingTextBoxFlag xmlns:ma14="http://schemas.microsoft.com/office/mac/drawingml/2011/main" xmlns:a14="http://schemas.microsoft.com/office/drawing/2010/main" xmlns:m="http://schemas.openxmlformats.org/officeDocument/2006/math" xmlns="" val="1"/>
+              <ma14:wrappingTextBoxFlag xmlns="" xmlns:m="http://schemas.openxmlformats.org/officeDocument/2006/math" xmlns:a14="http://schemas.microsoft.com/office/drawing/2010/main" xmlns:ma14="http://schemas.microsoft.com/office/mac/drawingml/2011/main" val="1"/>
             </a:ext>
           </a:extLst>
         </p:spPr>
@@ -3569,7 +3569,7 @@
           </a:ln>
           <a:extLst>
             <a:ext uri="{C572A759-6A51-4108-AA02-DFA0A04FC94B}">
-              <ma14:wrappingTextBoxFlag xmlns:ma14="http://schemas.microsoft.com/office/mac/drawingml/2011/main" xmlns:a14="http://schemas.microsoft.com/office/drawing/2010/main" xmlns:m="http://schemas.openxmlformats.org/officeDocument/2006/math" xmlns="" val="1"/>
+              <ma14:wrappingTextBoxFlag xmlns="" xmlns:m="http://schemas.openxmlformats.org/officeDocument/2006/math" xmlns:a14="http://schemas.microsoft.com/office/drawing/2010/main" xmlns:ma14="http://schemas.microsoft.com/office/mac/drawingml/2011/main" val="1"/>
             </a:ext>
           </a:extLst>
         </p:spPr>
@@ -3673,7 +3673,7 @@
           </a:ln>
           <a:extLst>
             <a:ext uri="{C572A759-6A51-4108-AA02-DFA0A04FC94B}">
-              <ma14:wrappingTextBoxFlag xmlns:ma14="http://schemas.microsoft.com/office/mac/drawingml/2011/main" xmlns:a14="http://schemas.microsoft.com/office/drawing/2010/main" xmlns:m="http://schemas.openxmlformats.org/officeDocument/2006/math" xmlns="" val="1"/>
+              <ma14:wrappingTextBoxFlag xmlns="" xmlns:m="http://schemas.openxmlformats.org/officeDocument/2006/math" xmlns:a14="http://schemas.microsoft.com/office/drawing/2010/main" xmlns:ma14="http://schemas.microsoft.com/office/mac/drawingml/2011/main" val="1"/>
             </a:ext>
           </a:extLst>
         </p:spPr>
@@ -3710,7 +3710,7 @@
           </a:ln>
           <a:extLst>
             <a:ext uri="{C572A759-6A51-4108-AA02-DFA0A04FC94B}">
-              <ma14:wrappingTextBoxFlag xmlns:ma14="http://schemas.microsoft.com/office/mac/drawingml/2011/main" xmlns:a14="http://schemas.microsoft.com/office/drawing/2010/main" xmlns:m="http://schemas.openxmlformats.org/officeDocument/2006/math" xmlns="" val="1"/>
+              <ma14:wrappingTextBoxFlag xmlns="" xmlns:m="http://schemas.openxmlformats.org/officeDocument/2006/math" xmlns:a14="http://schemas.microsoft.com/office/drawing/2010/main" xmlns:ma14="http://schemas.microsoft.com/office/mac/drawingml/2011/main" val="1"/>
             </a:ext>
           </a:extLst>
         </p:spPr>
@@ -3771,7 +3771,7 @@
           </a:ln>
           <a:extLst>
             <a:ext uri="{C572A759-6A51-4108-AA02-DFA0A04FC94B}">
-              <ma14:wrappingTextBoxFlag xmlns:ma14="http://schemas.microsoft.com/office/mac/drawingml/2011/main" xmlns:a14="http://schemas.microsoft.com/office/drawing/2010/main" xmlns:m="http://schemas.openxmlformats.org/officeDocument/2006/math" xmlns="" val="1"/>
+              <ma14:wrappingTextBoxFlag xmlns="" xmlns:m="http://schemas.openxmlformats.org/officeDocument/2006/math" xmlns:a14="http://schemas.microsoft.com/office/drawing/2010/main" xmlns:ma14="http://schemas.microsoft.com/office/mac/drawingml/2011/main" val="1"/>
             </a:ext>
           </a:extLst>
         </p:spPr>
@@ -3947,7 +3947,7 @@
           </a:ln>
           <a:extLst>
             <a:ext uri="{C572A759-6A51-4108-AA02-DFA0A04FC94B}">
-              <ma14:wrappingTextBoxFlag xmlns:ma14="http://schemas.microsoft.com/office/mac/drawingml/2011/main" xmlns:a14="http://schemas.microsoft.com/office/drawing/2010/main" xmlns:m="http://schemas.openxmlformats.org/officeDocument/2006/math" xmlns="" val="1"/>
+              <ma14:wrappingTextBoxFlag xmlns="" xmlns:m="http://schemas.openxmlformats.org/officeDocument/2006/math" xmlns:a14="http://schemas.microsoft.com/office/drawing/2010/main" xmlns:ma14="http://schemas.microsoft.com/office/mac/drawingml/2011/main" val="1"/>
             </a:ext>
           </a:extLst>
         </p:spPr>
@@ -3984,7 +3984,7 @@
           </a:ln>
           <a:extLst>
             <a:ext uri="{C572A759-6A51-4108-AA02-DFA0A04FC94B}">
-              <ma14:wrappingTextBoxFlag xmlns:ma14="http://schemas.microsoft.com/office/mac/drawingml/2011/main" xmlns:a14="http://schemas.microsoft.com/office/drawing/2010/main" xmlns:m="http://schemas.openxmlformats.org/officeDocument/2006/math" xmlns="" val="1"/>
+              <ma14:wrappingTextBoxFlag xmlns="" xmlns:m="http://schemas.openxmlformats.org/officeDocument/2006/math" xmlns:a14="http://schemas.microsoft.com/office/drawing/2010/main" xmlns:ma14="http://schemas.microsoft.com/office/mac/drawingml/2011/main" val="1"/>
             </a:ext>
           </a:extLst>
         </p:spPr>
@@ -4041,7 +4041,7 @@
           </a:ln>
           <a:extLst>
             <a:ext uri="{C572A759-6A51-4108-AA02-DFA0A04FC94B}">
-              <ma14:wrappingTextBoxFlag xmlns:ma14="http://schemas.microsoft.com/office/mac/drawingml/2011/main" xmlns:a14="http://schemas.microsoft.com/office/drawing/2010/main" xmlns:m="http://schemas.openxmlformats.org/officeDocument/2006/math" xmlns="" val="1"/>
+              <ma14:wrappingTextBoxFlag xmlns="" xmlns:m="http://schemas.openxmlformats.org/officeDocument/2006/math" xmlns:a14="http://schemas.microsoft.com/office/drawing/2010/main" xmlns:ma14="http://schemas.microsoft.com/office/mac/drawingml/2011/main" val="1"/>
             </a:ext>
           </a:extLst>
         </p:spPr>
@@ -4238,7 +4238,7 @@
           </a:ln>
           <a:extLst>
             <a:ext uri="{C572A759-6A51-4108-AA02-DFA0A04FC94B}">
-              <ma14:wrappingTextBoxFlag xmlns:ma14="http://schemas.microsoft.com/office/mac/drawingml/2011/main" xmlns:a14="http://schemas.microsoft.com/office/drawing/2010/main" xmlns:m="http://schemas.openxmlformats.org/officeDocument/2006/math" xmlns="" val="1"/>
+              <ma14:wrappingTextBoxFlag xmlns="" xmlns:m="http://schemas.openxmlformats.org/officeDocument/2006/math" xmlns:a14="http://schemas.microsoft.com/office/drawing/2010/main" xmlns:ma14="http://schemas.microsoft.com/office/mac/drawingml/2011/main" val="1"/>
             </a:ext>
           </a:extLst>
         </p:spPr>
@@ -4275,7 +4275,7 @@
           </a:ln>
           <a:extLst>
             <a:ext uri="{C572A759-6A51-4108-AA02-DFA0A04FC94B}">
-              <ma14:wrappingTextBoxFlag xmlns:ma14="http://schemas.microsoft.com/office/mac/drawingml/2011/main" xmlns:a14="http://schemas.microsoft.com/office/drawing/2010/main" xmlns:m="http://schemas.openxmlformats.org/officeDocument/2006/math" xmlns="" val="1"/>
+              <ma14:wrappingTextBoxFlag xmlns="" xmlns:m="http://schemas.openxmlformats.org/officeDocument/2006/math" xmlns:a14="http://schemas.microsoft.com/office/drawing/2010/main" xmlns:ma14="http://schemas.microsoft.com/office/mac/drawingml/2011/main" val="1"/>
             </a:ext>
           </a:extLst>
         </p:spPr>
@@ -4332,7 +4332,7 @@
           </a:ln>
           <a:extLst>
             <a:ext uri="{C572A759-6A51-4108-AA02-DFA0A04FC94B}">
-              <ma14:wrappingTextBoxFlag xmlns:ma14="http://schemas.microsoft.com/office/mac/drawingml/2011/main" xmlns:a14="http://schemas.microsoft.com/office/drawing/2010/main" xmlns:m="http://schemas.openxmlformats.org/officeDocument/2006/math" xmlns="" val="1"/>
+              <ma14:wrappingTextBoxFlag xmlns="" xmlns:m="http://schemas.openxmlformats.org/officeDocument/2006/math" xmlns:a14="http://schemas.microsoft.com/office/drawing/2010/main" xmlns:ma14="http://schemas.microsoft.com/office/mac/drawingml/2011/main" val="1"/>
             </a:ext>
           </a:extLst>
         </p:spPr>
@@ -4529,7 +4529,7 @@
           </a:ln>
           <a:extLst>
             <a:ext uri="{C572A759-6A51-4108-AA02-DFA0A04FC94B}">
-              <ma14:wrappingTextBoxFlag xmlns:ma14="http://schemas.microsoft.com/office/mac/drawingml/2011/main" xmlns:a14="http://schemas.microsoft.com/office/drawing/2010/main" xmlns:m="http://schemas.openxmlformats.org/officeDocument/2006/math" xmlns="" val="1"/>
+              <ma14:wrappingTextBoxFlag xmlns="" xmlns:m="http://schemas.openxmlformats.org/officeDocument/2006/math" xmlns:a14="http://schemas.microsoft.com/office/drawing/2010/main" xmlns:ma14="http://schemas.microsoft.com/office/mac/drawingml/2011/main" val="1"/>
             </a:ext>
           </a:extLst>
         </p:spPr>
@@ -4566,7 +4566,7 @@
           </a:ln>
           <a:extLst>
             <a:ext uri="{C572A759-6A51-4108-AA02-DFA0A04FC94B}">
-              <ma14:wrappingTextBoxFlag xmlns:ma14="http://schemas.microsoft.com/office/mac/drawingml/2011/main" xmlns:a14="http://schemas.microsoft.com/office/drawing/2010/main" xmlns:m="http://schemas.openxmlformats.org/officeDocument/2006/math" xmlns="" val="1"/>
+              <ma14:wrappingTextBoxFlag xmlns="" xmlns:m="http://schemas.openxmlformats.org/officeDocument/2006/math" xmlns:a14="http://schemas.microsoft.com/office/drawing/2010/main" xmlns:ma14="http://schemas.microsoft.com/office/mac/drawingml/2011/main" val="1"/>
             </a:ext>
           </a:extLst>
         </p:spPr>
@@ -4623,7 +4623,7 @@
           </a:ln>
           <a:extLst>
             <a:ext uri="{C572A759-6A51-4108-AA02-DFA0A04FC94B}">
-              <ma14:wrappingTextBoxFlag xmlns:ma14="http://schemas.microsoft.com/office/mac/drawingml/2011/main" xmlns:a14="http://schemas.microsoft.com/office/drawing/2010/main" xmlns:m="http://schemas.openxmlformats.org/officeDocument/2006/math" xmlns="" val="1"/>
+              <ma14:wrappingTextBoxFlag xmlns="" xmlns:m="http://schemas.openxmlformats.org/officeDocument/2006/math" xmlns:a14="http://schemas.microsoft.com/office/drawing/2010/main" xmlns:ma14="http://schemas.microsoft.com/office/mac/drawingml/2011/main" val="1"/>
             </a:ext>
           </a:extLst>
         </p:spPr>
@@ -4820,7 +4820,7 @@
           </a:ln>
           <a:extLst>
             <a:ext uri="{C572A759-6A51-4108-AA02-DFA0A04FC94B}">
-              <ma14:wrappingTextBoxFlag xmlns:ma14="http://schemas.microsoft.com/office/mac/drawingml/2011/main" xmlns:a14="http://schemas.microsoft.com/office/drawing/2010/main" xmlns:m="http://schemas.openxmlformats.org/officeDocument/2006/math" xmlns="" val="1"/>
+              <ma14:wrappingTextBoxFlag xmlns="" xmlns:m="http://schemas.openxmlformats.org/officeDocument/2006/math" xmlns:a14="http://schemas.microsoft.com/office/drawing/2010/main" xmlns:ma14="http://schemas.microsoft.com/office/mac/drawingml/2011/main" val="1"/>
             </a:ext>
           </a:extLst>
         </p:spPr>
@@ -4857,7 +4857,7 @@
           </a:ln>
           <a:extLst>
             <a:ext uri="{C572A759-6A51-4108-AA02-DFA0A04FC94B}">
-              <ma14:wrappingTextBoxFlag xmlns:ma14="http://schemas.microsoft.com/office/mac/drawingml/2011/main" xmlns:a14="http://schemas.microsoft.com/office/drawing/2010/main" xmlns:m="http://schemas.openxmlformats.org/officeDocument/2006/math" xmlns="" val="1"/>
+              <ma14:wrappingTextBoxFlag xmlns="" xmlns:m="http://schemas.openxmlformats.org/officeDocument/2006/math" xmlns:a14="http://schemas.microsoft.com/office/drawing/2010/main" xmlns:ma14="http://schemas.microsoft.com/office/mac/drawingml/2011/main" val="1"/>
             </a:ext>
           </a:extLst>
         </p:spPr>
@@ -5797,7 +5797,7 @@
           </a:ln>
           <a:extLst>
             <a:ext uri="{C572A759-6A51-4108-AA02-DFA0A04FC94B}">
-              <ma14:wrappingTextBoxFlag xmlns:ma14="http://schemas.microsoft.com/office/mac/drawingml/2011/main" xmlns:a14="http://schemas.microsoft.com/office/drawing/2010/main" xmlns:m="http://schemas.openxmlformats.org/officeDocument/2006/math" xmlns="" val="1"/>
+              <ma14:wrappingTextBoxFlag xmlns="" xmlns:m="http://schemas.openxmlformats.org/officeDocument/2006/math" xmlns:a14="http://schemas.microsoft.com/office/drawing/2010/main" xmlns:ma14="http://schemas.microsoft.com/office/mac/drawingml/2011/main" val="1"/>
             </a:ext>
           </a:extLst>
         </p:spPr>
@@ -5834,7 +5834,7 @@
           </a:ln>
           <a:extLst>
             <a:ext uri="{C572A759-6A51-4108-AA02-DFA0A04FC94B}">
-              <ma14:wrappingTextBoxFlag xmlns:ma14="http://schemas.microsoft.com/office/mac/drawingml/2011/main" xmlns:a14="http://schemas.microsoft.com/office/drawing/2010/main" xmlns:m="http://schemas.openxmlformats.org/officeDocument/2006/math" xmlns="" val="1"/>
+              <ma14:wrappingTextBoxFlag xmlns="" xmlns:m="http://schemas.openxmlformats.org/officeDocument/2006/math" xmlns:a14="http://schemas.microsoft.com/office/drawing/2010/main" xmlns:ma14="http://schemas.microsoft.com/office/mac/drawingml/2011/main" val="1"/>
             </a:ext>
           </a:extLst>
         </p:spPr>
@@ -6794,7 +6794,7 @@
           </a:ln>
           <a:extLst>
             <a:ext uri="{C572A759-6A51-4108-AA02-DFA0A04FC94B}">
-              <ma14:wrappingTextBoxFlag xmlns:ma14="http://schemas.microsoft.com/office/mac/drawingml/2011/main" xmlns:a14="http://schemas.microsoft.com/office/drawing/2010/main" xmlns:m="http://schemas.openxmlformats.org/officeDocument/2006/math" xmlns="" val="1"/>
+              <ma14:wrappingTextBoxFlag xmlns="" xmlns:m="http://schemas.openxmlformats.org/officeDocument/2006/math" xmlns:a14="http://schemas.microsoft.com/office/drawing/2010/main" xmlns:ma14="http://schemas.microsoft.com/office/mac/drawingml/2011/main" val="1"/>
             </a:ext>
           </a:extLst>
         </p:spPr>
@@ -6831,7 +6831,7 @@
           </a:ln>
           <a:extLst>
             <a:ext uri="{C572A759-6A51-4108-AA02-DFA0A04FC94B}">
-              <ma14:wrappingTextBoxFlag xmlns:ma14="http://schemas.microsoft.com/office/mac/drawingml/2011/main" xmlns:a14="http://schemas.microsoft.com/office/drawing/2010/main" xmlns:m="http://schemas.openxmlformats.org/officeDocument/2006/math" xmlns="" val="1"/>
+              <ma14:wrappingTextBoxFlag xmlns="" xmlns:m="http://schemas.openxmlformats.org/officeDocument/2006/math" xmlns:a14="http://schemas.microsoft.com/office/drawing/2010/main" xmlns:ma14="http://schemas.microsoft.com/office/mac/drawingml/2011/main" val="1"/>
             </a:ext>
           </a:extLst>
         </p:spPr>
@@ -6986,7 +6986,7 @@
           </a:ln>
           <a:extLst>
             <a:ext uri="{C572A759-6A51-4108-AA02-DFA0A04FC94B}">
-              <ma14:wrappingTextBoxFlag xmlns:ma14="http://schemas.microsoft.com/office/mac/drawingml/2011/main" xmlns:a14="http://schemas.microsoft.com/office/drawing/2010/main" xmlns:m="http://schemas.openxmlformats.org/officeDocument/2006/math" xmlns="" val="1"/>
+              <ma14:wrappingTextBoxFlag xmlns="" xmlns:m="http://schemas.openxmlformats.org/officeDocument/2006/math" xmlns:a14="http://schemas.microsoft.com/office/drawing/2010/main" xmlns:ma14="http://schemas.microsoft.com/office/mac/drawingml/2011/main" val="1"/>
             </a:ext>
           </a:extLst>
         </p:spPr>
@@ -7042,7 +7042,7 @@
           </a:ln>
           <a:extLst>
             <a:ext uri="{C572A759-6A51-4108-AA02-DFA0A04FC94B}">
-              <ma14:wrappingTextBoxFlag xmlns:ma14="http://schemas.microsoft.com/office/mac/drawingml/2011/main" xmlns:a14="http://schemas.microsoft.com/office/drawing/2010/main" xmlns:m="http://schemas.openxmlformats.org/officeDocument/2006/math" xmlns="" val="1"/>
+              <ma14:wrappingTextBoxFlag xmlns="" xmlns:m="http://schemas.openxmlformats.org/officeDocument/2006/math" xmlns:a14="http://schemas.microsoft.com/office/drawing/2010/main" xmlns:ma14="http://schemas.microsoft.com/office/mac/drawingml/2011/main" val="1"/>
             </a:ext>
           </a:extLst>
         </p:spPr>
@@ -7099,7 +7099,7 @@
           </a:ln>
           <a:extLst>
             <a:ext uri="{C572A759-6A51-4108-AA02-DFA0A04FC94B}">
-              <ma14:wrappingTextBoxFlag xmlns:ma14="http://schemas.microsoft.com/office/mac/drawingml/2011/main" xmlns:a14="http://schemas.microsoft.com/office/drawing/2010/main" xmlns:m="http://schemas.openxmlformats.org/officeDocument/2006/math" xmlns="" val="1"/>
+              <ma14:wrappingTextBoxFlag xmlns="" xmlns:m="http://schemas.openxmlformats.org/officeDocument/2006/math" xmlns:a14="http://schemas.microsoft.com/office/drawing/2010/main" xmlns:ma14="http://schemas.microsoft.com/office/mac/drawingml/2011/main" val="1"/>
             </a:ext>
           </a:extLst>
         </p:spPr>
@@ -7125,7 +7125,7 @@
             <a:pPr algn="just"/>
             <a:r>
               <a:rPr lang="ru-RU" sz="2400" dirty="0"/>
-              <a:t>При работе с большими объектами перемещение указателей проще чем копирование</a:t>
+              <a:t>При работе с большими объектами перемещение указателей проще, чем копирование</a:t>
             </a:r>
             <a:endParaRPr sz="2400" dirty="0"/>
           </a:p>
@@ -7250,7 +7250,7 @@
           </a:ln>
           <a:extLst>
             <a:ext uri="{C572A759-6A51-4108-AA02-DFA0A04FC94B}">
-              <ma14:wrappingTextBoxFlag xmlns:ma14="http://schemas.microsoft.com/office/mac/drawingml/2011/main" xmlns:a14="http://schemas.microsoft.com/office/drawing/2010/main" xmlns:m="http://schemas.openxmlformats.org/officeDocument/2006/math" xmlns="" val="1"/>
+              <ma14:wrappingTextBoxFlag xmlns="" xmlns:m="http://schemas.openxmlformats.org/officeDocument/2006/math" xmlns:a14="http://schemas.microsoft.com/office/drawing/2010/main" xmlns:ma14="http://schemas.microsoft.com/office/mac/drawingml/2011/main" val="1"/>
             </a:ext>
           </a:extLst>
         </p:spPr>
@@ -7275,7 +7275,7 @@
           <a:p>
             <a:r>
               <a:rPr lang="ru-RU" sz="2400" dirty="0"/>
-              <a:t>Использую дополнительную память для указателей</a:t>
+              <a:t>Используют дополнительную память для указателей</a:t>
             </a:r>
             <a:endParaRPr sz="2400" dirty="0"/>
           </a:p>
@@ -7353,7 +7353,7 @@
           </a:ln>
           <a:extLst>
             <a:ext uri="{C572A759-6A51-4108-AA02-DFA0A04FC94B}">
-              <ma14:wrappingTextBoxFlag xmlns:ma14="http://schemas.microsoft.com/office/mac/drawingml/2011/main" xmlns:a14="http://schemas.microsoft.com/office/drawing/2010/main" xmlns:m="http://schemas.openxmlformats.org/officeDocument/2006/math" xmlns="" val="1"/>
+              <ma14:wrappingTextBoxFlag xmlns="" xmlns:m="http://schemas.openxmlformats.org/officeDocument/2006/math" xmlns:a14="http://schemas.microsoft.com/office/drawing/2010/main" xmlns:ma14="http://schemas.microsoft.com/office/mac/drawingml/2011/main" val="1"/>
             </a:ext>
           </a:extLst>
         </p:spPr>
@@ -7456,7 +7456,7 @@
           </a:ln>
           <a:extLst>
             <a:ext uri="{C572A759-6A51-4108-AA02-DFA0A04FC94B}">
-              <ma14:wrappingTextBoxFlag xmlns:ma14="http://schemas.microsoft.com/office/mac/drawingml/2011/main" xmlns:a14="http://schemas.microsoft.com/office/drawing/2010/main" xmlns:m="http://schemas.openxmlformats.org/officeDocument/2006/math" xmlns="" val="1"/>
+              <ma14:wrappingTextBoxFlag xmlns="" xmlns:m="http://schemas.openxmlformats.org/officeDocument/2006/math" xmlns:a14="http://schemas.microsoft.com/office/drawing/2010/main" xmlns:ma14="http://schemas.microsoft.com/office/mac/drawingml/2011/main" val="1"/>
             </a:ext>
           </a:extLst>
         </p:spPr>
@@ -7564,7 +7564,7 @@
           </a:ln>
           <a:extLst>
             <a:ext uri="{C572A759-6A51-4108-AA02-DFA0A04FC94B}">
-              <ma14:wrappingTextBoxFlag xmlns:ma14="http://schemas.microsoft.com/office/mac/drawingml/2011/main" xmlns:a14="http://schemas.microsoft.com/office/drawing/2010/main" xmlns:m="http://schemas.openxmlformats.org/officeDocument/2006/math" xmlns="" val="1"/>
+              <ma14:wrappingTextBoxFlag xmlns="" xmlns:m="http://schemas.openxmlformats.org/officeDocument/2006/math" xmlns:a14="http://schemas.microsoft.com/office/drawing/2010/main" xmlns:ma14="http://schemas.microsoft.com/office/mac/drawingml/2011/main" val="1"/>
             </a:ext>
           </a:extLst>
         </p:spPr>
@@ -7601,7 +7601,7 @@
           </a:ln>
           <a:extLst>
             <a:ext uri="{C572A759-6A51-4108-AA02-DFA0A04FC94B}">
-              <ma14:wrappingTextBoxFlag xmlns:ma14="http://schemas.microsoft.com/office/mac/drawingml/2011/main" xmlns:a14="http://schemas.microsoft.com/office/drawing/2010/main" xmlns:m="http://schemas.openxmlformats.org/officeDocument/2006/math" xmlns="" val="1"/>
+              <ma14:wrappingTextBoxFlag xmlns="" xmlns:m="http://schemas.openxmlformats.org/officeDocument/2006/math" xmlns:a14="http://schemas.microsoft.com/office/drawing/2010/main" xmlns:ma14="http://schemas.microsoft.com/office/mac/drawingml/2011/main" val="1"/>
             </a:ext>
           </a:extLst>
         </p:spPr>
@@ -7749,7 +7749,7 @@
           </a:ln>
           <a:extLst>
             <a:ext uri="{C572A759-6A51-4108-AA02-DFA0A04FC94B}">
-              <ma14:wrappingTextBoxFlag xmlns:ma14="http://schemas.microsoft.com/office/mac/drawingml/2011/main" xmlns:a14="http://schemas.microsoft.com/office/drawing/2010/main" xmlns:m="http://schemas.openxmlformats.org/officeDocument/2006/math" xmlns="" val="1"/>
+              <ma14:wrappingTextBoxFlag xmlns="" xmlns:m="http://schemas.openxmlformats.org/officeDocument/2006/math" xmlns:a14="http://schemas.microsoft.com/office/drawing/2010/main" xmlns:ma14="http://schemas.microsoft.com/office/mac/drawingml/2011/main" val="1"/>
             </a:ext>
           </a:extLst>
         </p:spPr>
@@ -7865,7 +7865,7 @@
           </a:ln>
           <a:extLst>
             <a:ext uri="{C572A759-6A51-4108-AA02-DFA0A04FC94B}">
-              <ma14:wrappingTextBoxFlag xmlns:ma14="http://schemas.microsoft.com/office/mac/drawingml/2011/main" xmlns:a14="http://schemas.microsoft.com/office/drawing/2010/main" xmlns:m="http://schemas.openxmlformats.org/officeDocument/2006/math" xmlns="" val="1"/>
+              <ma14:wrappingTextBoxFlag xmlns="" xmlns:m="http://schemas.openxmlformats.org/officeDocument/2006/math" xmlns:a14="http://schemas.microsoft.com/office/drawing/2010/main" xmlns:ma14="http://schemas.microsoft.com/office/mac/drawingml/2011/main" val="1"/>
             </a:ext>
           </a:extLst>
         </p:spPr>
@@ -7902,7 +7902,7 @@
           </a:ln>
           <a:extLst>
             <a:ext uri="{C572A759-6A51-4108-AA02-DFA0A04FC94B}">
-              <ma14:wrappingTextBoxFlag xmlns:ma14="http://schemas.microsoft.com/office/mac/drawingml/2011/main" xmlns:a14="http://schemas.microsoft.com/office/drawing/2010/main" xmlns:m="http://schemas.openxmlformats.org/officeDocument/2006/math" xmlns="" val="1"/>
+              <ma14:wrappingTextBoxFlag xmlns="" xmlns:m="http://schemas.openxmlformats.org/officeDocument/2006/math" xmlns:a14="http://schemas.microsoft.com/office/drawing/2010/main" xmlns:ma14="http://schemas.microsoft.com/office/mac/drawingml/2011/main" val="1"/>
             </a:ext>
           </a:extLst>
         </p:spPr>
@@ -8130,7 +8130,7 @@
           </a:ln>
           <a:extLst>
             <a:ext uri="{C572A759-6A51-4108-AA02-DFA0A04FC94B}">
-              <ma14:wrappingTextBoxFlag xmlns:ma14="http://schemas.microsoft.com/office/mac/drawingml/2011/main" xmlns:a14="http://schemas.microsoft.com/office/drawing/2010/main" xmlns:m="http://schemas.openxmlformats.org/officeDocument/2006/math" xmlns="" val="1"/>
+              <ma14:wrappingTextBoxFlag xmlns="" xmlns:m="http://schemas.openxmlformats.org/officeDocument/2006/math" xmlns:a14="http://schemas.microsoft.com/office/drawing/2010/main" xmlns:ma14="http://schemas.microsoft.com/office/mac/drawingml/2011/main" val="1"/>
             </a:ext>
           </a:extLst>
         </p:spPr>
@@ -8167,7 +8167,7 @@
           </a:ln>
           <a:extLst>
             <a:ext uri="{C572A759-6A51-4108-AA02-DFA0A04FC94B}">
-              <ma14:wrappingTextBoxFlag xmlns:ma14="http://schemas.microsoft.com/office/mac/drawingml/2011/main" xmlns:a14="http://schemas.microsoft.com/office/drawing/2010/main" xmlns:m="http://schemas.openxmlformats.org/officeDocument/2006/math" xmlns="" val="1"/>
+              <ma14:wrappingTextBoxFlag xmlns="" xmlns:m="http://schemas.openxmlformats.org/officeDocument/2006/math" xmlns:a14="http://schemas.microsoft.com/office/drawing/2010/main" xmlns:ma14="http://schemas.microsoft.com/office/mac/drawingml/2011/main" val="1"/>
             </a:ext>
           </a:extLst>
         </p:spPr>
@@ -8365,7 +8365,7 @@
           </a:ln>
           <a:extLst>
             <a:ext uri="{C572A759-6A51-4108-AA02-DFA0A04FC94B}">
-              <ma14:wrappingTextBoxFlag xmlns:ma14="http://schemas.microsoft.com/office/mac/drawingml/2011/main" xmlns:a14="http://schemas.microsoft.com/office/drawing/2010/main" xmlns:m="http://schemas.openxmlformats.org/officeDocument/2006/math" xmlns="" val="1"/>
+              <ma14:wrappingTextBoxFlag xmlns="" xmlns:m="http://schemas.openxmlformats.org/officeDocument/2006/math" xmlns:a14="http://schemas.microsoft.com/office/drawing/2010/main" xmlns:ma14="http://schemas.microsoft.com/office/mac/drawingml/2011/main" val="1"/>
             </a:ext>
           </a:extLst>
         </p:spPr>
@@ -8402,7 +8402,7 @@
           </a:ln>
           <a:extLst>
             <a:ext uri="{C572A759-6A51-4108-AA02-DFA0A04FC94B}">
-              <ma14:wrappingTextBoxFlag xmlns:ma14="http://schemas.microsoft.com/office/mac/drawingml/2011/main" xmlns:a14="http://schemas.microsoft.com/office/drawing/2010/main" xmlns:m="http://schemas.openxmlformats.org/officeDocument/2006/math" xmlns="" val="1"/>
+              <ma14:wrappingTextBoxFlag xmlns="" xmlns:m="http://schemas.openxmlformats.org/officeDocument/2006/math" xmlns:a14="http://schemas.microsoft.com/office/drawing/2010/main" xmlns:ma14="http://schemas.microsoft.com/office/mac/drawingml/2011/main" val="1"/>
             </a:ext>
           </a:extLst>
         </p:spPr>
@@ -8532,7 +8532,7 @@
           </a:ln>
           <a:extLst>
             <a:ext uri="{C572A759-6A51-4108-AA02-DFA0A04FC94B}">
-              <ma14:wrappingTextBoxFlag xmlns:ma14="http://schemas.microsoft.com/office/mac/drawingml/2011/main" xmlns:a14="http://schemas.microsoft.com/office/drawing/2010/main" xmlns:m="http://schemas.openxmlformats.org/officeDocument/2006/math" xmlns="" val="1"/>
+              <ma14:wrappingTextBoxFlag xmlns="" xmlns:m="http://schemas.openxmlformats.org/officeDocument/2006/math" xmlns:a14="http://schemas.microsoft.com/office/drawing/2010/main" xmlns:ma14="http://schemas.microsoft.com/office/mac/drawingml/2011/main" val="1"/>
             </a:ext>
           </a:extLst>
         </p:spPr>
@@ -8648,7 +8648,7 @@
           </a:ln>
           <a:extLst>
             <a:ext uri="{C572A759-6A51-4108-AA02-DFA0A04FC94B}">
-              <ma14:wrappingTextBoxFlag xmlns:ma14="http://schemas.microsoft.com/office/mac/drawingml/2011/main" xmlns:a14="http://schemas.microsoft.com/office/drawing/2010/main" xmlns:m="http://schemas.openxmlformats.org/officeDocument/2006/math" xmlns="" val="1"/>
+              <ma14:wrappingTextBoxFlag xmlns="" xmlns:m="http://schemas.openxmlformats.org/officeDocument/2006/math" xmlns:a14="http://schemas.microsoft.com/office/drawing/2010/main" xmlns:ma14="http://schemas.microsoft.com/office/mac/drawingml/2011/main" val="1"/>
             </a:ext>
           </a:extLst>
         </p:spPr>
@@ -8685,7 +8685,7 @@
           </a:ln>
           <a:extLst>
             <a:ext uri="{C572A759-6A51-4108-AA02-DFA0A04FC94B}">
-              <ma14:wrappingTextBoxFlag xmlns:ma14="http://schemas.microsoft.com/office/mac/drawingml/2011/main" xmlns:a14="http://schemas.microsoft.com/office/drawing/2010/main" xmlns:m="http://schemas.openxmlformats.org/officeDocument/2006/math" xmlns="" val="1"/>
+              <ma14:wrappingTextBoxFlag xmlns="" xmlns:m="http://schemas.openxmlformats.org/officeDocument/2006/math" xmlns:a14="http://schemas.microsoft.com/office/drawing/2010/main" xmlns:ma14="http://schemas.microsoft.com/office/mac/drawingml/2011/main" val="1"/>
             </a:ext>
           </a:extLst>
         </p:spPr>
@@ -8865,7 +8865,7 @@
           </a:ln>
           <a:extLst>
             <a:ext uri="{C572A759-6A51-4108-AA02-DFA0A04FC94B}">
-              <ma14:wrappingTextBoxFlag xmlns:ma14="http://schemas.microsoft.com/office/mac/drawingml/2011/main" xmlns:a14="http://schemas.microsoft.com/office/drawing/2010/main" xmlns:m="http://schemas.openxmlformats.org/officeDocument/2006/math" xmlns="" val="1"/>
+              <ma14:wrappingTextBoxFlag xmlns="" xmlns:m="http://schemas.openxmlformats.org/officeDocument/2006/math" xmlns:a14="http://schemas.microsoft.com/office/drawing/2010/main" xmlns:ma14="http://schemas.microsoft.com/office/mac/drawingml/2011/main" val="1"/>
             </a:ext>
           </a:extLst>
         </p:spPr>
@@ -8902,7 +8902,7 @@
           </a:ln>
           <a:extLst>
             <a:ext uri="{C572A759-6A51-4108-AA02-DFA0A04FC94B}">
-              <ma14:wrappingTextBoxFlag xmlns:ma14="http://schemas.microsoft.com/office/mac/drawingml/2011/main" xmlns:a14="http://schemas.microsoft.com/office/drawing/2010/main" xmlns:m="http://schemas.openxmlformats.org/officeDocument/2006/math" xmlns="" val="1"/>
+              <ma14:wrappingTextBoxFlag xmlns="" xmlns:m="http://schemas.openxmlformats.org/officeDocument/2006/math" xmlns:a14="http://schemas.microsoft.com/office/drawing/2010/main" xmlns:ma14="http://schemas.microsoft.com/office/mac/drawingml/2011/main" val="1"/>
             </a:ext>
           </a:extLst>
         </p:spPr>
@@ -9082,7 +9082,7 @@
           </a:ln>
           <a:extLst>
             <a:ext uri="{C572A759-6A51-4108-AA02-DFA0A04FC94B}">
-              <ma14:wrappingTextBoxFlag xmlns:ma14="http://schemas.microsoft.com/office/mac/drawingml/2011/main" xmlns:a14="http://schemas.microsoft.com/office/drawing/2010/main" xmlns:m="http://schemas.openxmlformats.org/officeDocument/2006/math" xmlns="" val="1"/>
+              <ma14:wrappingTextBoxFlag xmlns="" xmlns:m="http://schemas.openxmlformats.org/officeDocument/2006/math" xmlns:a14="http://schemas.microsoft.com/office/drawing/2010/main" xmlns:ma14="http://schemas.microsoft.com/office/mac/drawingml/2011/main" val="1"/>
             </a:ext>
           </a:extLst>
         </p:spPr>
@@ -9119,7 +9119,7 @@
           </a:ln>
           <a:extLst>
             <a:ext uri="{C572A759-6A51-4108-AA02-DFA0A04FC94B}">
-              <ma14:wrappingTextBoxFlag xmlns:ma14="http://schemas.microsoft.com/office/mac/drawingml/2011/main" xmlns:a14="http://schemas.microsoft.com/office/drawing/2010/main" xmlns:m="http://schemas.openxmlformats.org/officeDocument/2006/math" xmlns="" val="1"/>
+              <ma14:wrappingTextBoxFlag xmlns="" xmlns:m="http://schemas.openxmlformats.org/officeDocument/2006/math" xmlns:a14="http://schemas.microsoft.com/office/drawing/2010/main" xmlns:ma14="http://schemas.microsoft.com/office/mac/drawingml/2011/main" val="1"/>
             </a:ext>
           </a:extLst>
         </p:spPr>
@@ -9316,7 +9316,7 @@
           </a:ln>
           <a:extLst>
             <a:ext uri="{C572A759-6A51-4108-AA02-DFA0A04FC94B}">
-              <ma14:wrappingTextBoxFlag xmlns:ma14="http://schemas.microsoft.com/office/mac/drawingml/2011/main" xmlns:a14="http://schemas.microsoft.com/office/drawing/2010/main" xmlns:m="http://schemas.openxmlformats.org/officeDocument/2006/math" xmlns="" val="1"/>
+              <ma14:wrappingTextBoxFlag xmlns="" xmlns:m="http://schemas.openxmlformats.org/officeDocument/2006/math" xmlns:a14="http://schemas.microsoft.com/office/drawing/2010/main" xmlns:ma14="http://schemas.microsoft.com/office/mac/drawingml/2011/main" val="1"/>
             </a:ext>
           </a:extLst>
         </p:spPr>
@@ -9353,7 +9353,7 @@
           </a:ln>
           <a:extLst>
             <a:ext uri="{C572A759-6A51-4108-AA02-DFA0A04FC94B}">
-              <ma14:wrappingTextBoxFlag xmlns:ma14="http://schemas.microsoft.com/office/mac/drawingml/2011/main" xmlns:a14="http://schemas.microsoft.com/office/drawing/2010/main" xmlns:m="http://schemas.openxmlformats.org/officeDocument/2006/math" xmlns="" val="1"/>
+              <ma14:wrappingTextBoxFlag xmlns="" xmlns:m="http://schemas.openxmlformats.org/officeDocument/2006/math" xmlns:a14="http://schemas.microsoft.com/office/drawing/2010/main" xmlns:ma14="http://schemas.microsoft.com/office/mac/drawingml/2011/main" val="1"/>
             </a:ext>
           </a:extLst>
         </p:spPr>
@@ -9583,7 +9583,7 @@
           </a:ln>
           <a:extLst>
             <a:ext uri="{C572A759-6A51-4108-AA02-DFA0A04FC94B}">
-              <ma14:wrappingTextBoxFlag xmlns:ma14="http://schemas.microsoft.com/office/mac/drawingml/2011/main" xmlns:a14="http://schemas.microsoft.com/office/drawing/2010/main" xmlns:m="http://schemas.openxmlformats.org/officeDocument/2006/math" xmlns="" val="1"/>
+              <ma14:wrappingTextBoxFlag xmlns="" xmlns:m="http://schemas.openxmlformats.org/officeDocument/2006/math" xmlns:a14="http://schemas.microsoft.com/office/drawing/2010/main" xmlns:ma14="http://schemas.microsoft.com/office/mac/drawingml/2011/main" val="1"/>
             </a:ext>
           </a:extLst>
         </p:spPr>
@@ -9620,7 +9620,7 @@
           </a:ln>
           <a:extLst>
             <a:ext uri="{C572A759-6A51-4108-AA02-DFA0A04FC94B}">
-              <ma14:wrappingTextBoxFlag xmlns:ma14="http://schemas.microsoft.com/office/mac/drawingml/2011/main" xmlns:a14="http://schemas.microsoft.com/office/drawing/2010/main" xmlns:m="http://schemas.openxmlformats.org/officeDocument/2006/math" xmlns="" val="1"/>
+              <ma14:wrappingTextBoxFlag xmlns="" xmlns:m="http://schemas.openxmlformats.org/officeDocument/2006/math" xmlns:a14="http://schemas.microsoft.com/office/drawing/2010/main" xmlns:ma14="http://schemas.microsoft.com/office/mac/drawingml/2011/main" val="1"/>
             </a:ext>
           </a:extLst>
         </p:spPr>
@@ -10167,7 +10167,7 @@
           </a:ln>
           <a:extLst>
             <a:ext uri="{C572A759-6A51-4108-AA02-DFA0A04FC94B}">
-              <ma14:wrappingTextBoxFlag xmlns:ma14="http://schemas.microsoft.com/office/mac/drawingml/2011/main" xmlns:a14="http://schemas.microsoft.com/office/drawing/2010/main" xmlns:m="http://schemas.openxmlformats.org/officeDocument/2006/math" xmlns="" val="1"/>
+              <ma14:wrappingTextBoxFlag xmlns="" xmlns:m="http://schemas.openxmlformats.org/officeDocument/2006/math" xmlns:a14="http://schemas.microsoft.com/office/drawing/2010/main" xmlns:ma14="http://schemas.microsoft.com/office/mac/drawingml/2011/main" val="1"/>
             </a:ext>
           </a:extLst>
         </p:spPr>
@@ -10204,7 +10204,7 @@
           </a:ln>
           <a:extLst>
             <a:ext uri="{C572A759-6A51-4108-AA02-DFA0A04FC94B}">
-              <ma14:wrappingTextBoxFlag xmlns:ma14="http://schemas.microsoft.com/office/mac/drawingml/2011/main" xmlns:a14="http://schemas.microsoft.com/office/drawing/2010/main" xmlns:m="http://schemas.openxmlformats.org/officeDocument/2006/math" xmlns="" val="1"/>
+              <ma14:wrappingTextBoxFlag xmlns="" xmlns:m="http://schemas.openxmlformats.org/officeDocument/2006/math" xmlns:a14="http://schemas.microsoft.com/office/drawing/2010/main" xmlns:ma14="http://schemas.microsoft.com/office/mac/drawingml/2011/main" val="1"/>
             </a:ext>
           </a:extLst>
         </p:spPr>
@@ -10432,7 +10432,7 @@
           </a:ln>
           <a:extLst>
             <a:ext uri="{C572A759-6A51-4108-AA02-DFA0A04FC94B}">
-              <ma14:wrappingTextBoxFlag xmlns:ma14="http://schemas.microsoft.com/office/mac/drawingml/2011/main" xmlns:a14="http://schemas.microsoft.com/office/drawing/2010/main" xmlns:m="http://schemas.openxmlformats.org/officeDocument/2006/math" xmlns="" val="1"/>
+              <ma14:wrappingTextBoxFlag xmlns="" xmlns:m="http://schemas.openxmlformats.org/officeDocument/2006/math" xmlns:a14="http://schemas.microsoft.com/office/drawing/2010/main" xmlns:ma14="http://schemas.microsoft.com/office/mac/drawingml/2011/main" val="1"/>
             </a:ext>
           </a:extLst>
         </p:spPr>
@@ -10469,7 +10469,7 @@
           </a:ln>
           <a:extLst>
             <a:ext uri="{C572A759-6A51-4108-AA02-DFA0A04FC94B}">
-              <ma14:wrappingTextBoxFlag xmlns:ma14="http://schemas.microsoft.com/office/mac/drawingml/2011/main" xmlns:a14="http://schemas.microsoft.com/office/drawing/2010/main" xmlns:m="http://schemas.openxmlformats.org/officeDocument/2006/math" xmlns="" val="1"/>
+              <ma14:wrappingTextBoxFlag xmlns="" xmlns:m="http://schemas.openxmlformats.org/officeDocument/2006/math" xmlns:a14="http://schemas.microsoft.com/office/drawing/2010/main" xmlns:ma14="http://schemas.microsoft.com/office/mac/drawingml/2011/main" val="1"/>
             </a:ext>
           </a:extLst>
         </p:spPr>
@@ -10670,7 +10670,7 @@
           </a:ln>
           <a:extLst>
             <a:ext uri="{C572A759-6A51-4108-AA02-DFA0A04FC94B}">
-              <ma14:wrappingTextBoxFlag xmlns:ma14="http://schemas.microsoft.com/office/mac/drawingml/2011/main" xmlns:a14="http://schemas.microsoft.com/office/drawing/2010/main" xmlns:m="http://schemas.openxmlformats.org/officeDocument/2006/math" xmlns="" val="1"/>
+              <ma14:wrappingTextBoxFlag xmlns="" xmlns:m="http://schemas.openxmlformats.org/officeDocument/2006/math" xmlns:a14="http://schemas.microsoft.com/office/drawing/2010/main" xmlns:ma14="http://schemas.microsoft.com/office/mac/drawingml/2011/main" val="1"/>
             </a:ext>
           </a:extLst>
         </p:spPr>
@@ -10707,7 +10707,7 @@
           </a:ln>
           <a:extLst>
             <a:ext uri="{C572A759-6A51-4108-AA02-DFA0A04FC94B}">
-              <ma14:wrappingTextBoxFlag xmlns:ma14="http://schemas.microsoft.com/office/mac/drawingml/2011/main" xmlns:a14="http://schemas.microsoft.com/office/drawing/2010/main" xmlns:m="http://schemas.openxmlformats.org/officeDocument/2006/math" xmlns="" val="1"/>
+              <ma14:wrappingTextBoxFlag xmlns="" xmlns:m="http://schemas.openxmlformats.org/officeDocument/2006/math" xmlns:a14="http://schemas.microsoft.com/office/drawing/2010/main" xmlns:ma14="http://schemas.microsoft.com/office/mac/drawingml/2011/main" val="1"/>
             </a:ext>
           </a:extLst>
         </p:spPr>
@@ -10887,7 +10887,7 @@
           </a:ln>
           <a:extLst>
             <a:ext uri="{C572A759-6A51-4108-AA02-DFA0A04FC94B}">
-              <ma14:wrappingTextBoxFlag xmlns:ma14="http://schemas.microsoft.com/office/mac/drawingml/2011/main" xmlns:a14="http://schemas.microsoft.com/office/drawing/2010/main" xmlns:m="http://schemas.openxmlformats.org/officeDocument/2006/math" xmlns="" val="1"/>
+              <ma14:wrappingTextBoxFlag xmlns="" xmlns:m="http://schemas.openxmlformats.org/officeDocument/2006/math" xmlns:a14="http://schemas.microsoft.com/office/drawing/2010/main" xmlns:ma14="http://schemas.microsoft.com/office/mac/drawingml/2011/main" val="1"/>
             </a:ext>
           </a:extLst>
         </p:spPr>
@@ -10924,7 +10924,7 @@
           </a:ln>
           <a:extLst>
             <a:ext uri="{C572A759-6A51-4108-AA02-DFA0A04FC94B}">
-              <ma14:wrappingTextBoxFlag xmlns:ma14="http://schemas.microsoft.com/office/mac/drawingml/2011/main" xmlns:a14="http://schemas.microsoft.com/office/drawing/2010/main" xmlns:m="http://schemas.openxmlformats.org/officeDocument/2006/math" xmlns="" val="1"/>
+              <ma14:wrappingTextBoxFlag xmlns="" xmlns:m="http://schemas.openxmlformats.org/officeDocument/2006/math" xmlns:a14="http://schemas.microsoft.com/office/drawing/2010/main" xmlns:ma14="http://schemas.microsoft.com/office/mac/drawingml/2011/main" val="1"/>
             </a:ext>
           </a:extLst>
         </p:spPr>
@@ -11104,7 +11104,7 @@
           </a:ln>
           <a:extLst>
             <a:ext uri="{C572A759-6A51-4108-AA02-DFA0A04FC94B}">
-              <ma14:wrappingTextBoxFlag xmlns:ma14="http://schemas.microsoft.com/office/mac/drawingml/2011/main" xmlns:a14="http://schemas.microsoft.com/office/drawing/2010/main" xmlns:m="http://schemas.openxmlformats.org/officeDocument/2006/math" xmlns="" val="1"/>
+              <ma14:wrappingTextBoxFlag xmlns="" xmlns:m="http://schemas.openxmlformats.org/officeDocument/2006/math" xmlns:a14="http://schemas.microsoft.com/office/drawing/2010/main" xmlns:ma14="http://schemas.microsoft.com/office/mac/drawingml/2011/main" val="1"/>
             </a:ext>
           </a:extLst>
         </p:spPr>
@@ -11141,7 +11141,7 @@
           </a:ln>
           <a:extLst>
             <a:ext uri="{C572A759-6A51-4108-AA02-DFA0A04FC94B}">
-              <ma14:wrappingTextBoxFlag xmlns:ma14="http://schemas.microsoft.com/office/mac/drawingml/2011/main" xmlns:a14="http://schemas.microsoft.com/office/drawing/2010/main" xmlns:m="http://schemas.openxmlformats.org/officeDocument/2006/math" xmlns="" val="1"/>
+              <ma14:wrappingTextBoxFlag xmlns="" xmlns:m="http://schemas.openxmlformats.org/officeDocument/2006/math" xmlns:a14="http://schemas.microsoft.com/office/drawing/2010/main" xmlns:ma14="http://schemas.microsoft.com/office/mac/drawingml/2011/main" val="1"/>
             </a:ext>
           </a:extLst>
         </p:spPr>
@@ -11294,7 +11294,7 @@
           </a:ln>
           <a:extLst>
             <a:ext uri="{C572A759-6A51-4108-AA02-DFA0A04FC94B}">
-              <ma14:wrappingTextBoxFlag xmlns:ma14="http://schemas.microsoft.com/office/mac/drawingml/2011/main" xmlns:a14="http://schemas.microsoft.com/office/drawing/2010/main" xmlns:m="http://schemas.openxmlformats.org/officeDocument/2006/math" xmlns="" val="1"/>
+              <ma14:wrappingTextBoxFlag xmlns="" xmlns:m="http://schemas.openxmlformats.org/officeDocument/2006/math" xmlns:a14="http://schemas.microsoft.com/office/drawing/2010/main" xmlns:ma14="http://schemas.microsoft.com/office/mac/drawingml/2011/main" val="1"/>
             </a:ext>
           </a:extLst>
         </p:spPr>
@@ -11331,7 +11331,7 @@
           </a:ln>
           <a:extLst>
             <a:ext uri="{C572A759-6A51-4108-AA02-DFA0A04FC94B}">
-              <ma14:wrappingTextBoxFlag xmlns:ma14="http://schemas.microsoft.com/office/mac/drawingml/2011/main" xmlns:a14="http://schemas.microsoft.com/office/drawing/2010/main" xmlns:m="http://schemas.openxmlformats.org/officeDocument/2006/math" xmlns="" val="1"/>
+              <ma14:wrappingTextBoxFlag xmlns="" xmlns:m="http://schemas.openxmlformats.org/officeDocument/2006/math" xmlns:a14="http://schemas.microsoft.com/office/drawing/2010/main" xmlns:ma14="http://schemas.microsoft.com/office/mac/drawingml/2011/main" val="1"/>
             </a:ext>
           </a:extLst>
         </p:spPr>
@@ -11536,7 +11536,7 @@
           </a:ln>
           <a:extLst>
             <a:ext uri="{C572A759-6A51-4108-AA02-DFA0A04FC94B}">
-              <ma14:wrappingTextBoxFlag xmlns:ma14="http://schemas.microsoft.com/office/mac/drawingml/2011/main" xmlns:a14="http://schemas.microsoft.com/office/drawing/2010/main" xmlns:m="http://schemas.openxmlformats.org/officeDocument/2006/math" xmlns="" val="1"/>
+              <ma14:wrappingTextBoxFlag xmlns="" xmlns:m="http://schemas.openxmlformats.org/officeDocument/2006/math" xmlns:a14="http://schemas.microsoft.com/office/drawing/2010/main" xmlns:ma14="http://schemas.microsoft.com/office/mac/drawingml/2011/main" val="1"/>
             </a:ext>
           </a:extLst>
         </p:spPr>
@@ -11573,7 +11573,7 @@
           </a:ln>
           <a:extLst>
             <a:ext uri="{C572A759-6A51-4108-AA02-DFA0A04FC94B}">
-              <ma14:wrappingTextBoxFlag xmlns:ma14="http://schemas.microsoft.com/office/mac/drawingml/2011/main" xmlns:a14="http://schemas.microsoft.com/office/drawing/2010/main" xmlns:m="http://schemas.openxmlformats.org/officeDocument/2006/math" xmlns="" val="1"/>
+              <ma14:wrappingTextBoxFlag xmlns="" xmlns:m="http://schemas.openxmlformats.org/officeDocument/2006/math" xmlns:a14="http://schemas.microsoft.com/office/drawing/2010/main" xmlns:ma14="http://schemas.microsoft.com/office/mac/drawingml/2011/main" val="1"/>
             </a:ext>
           </a:extLst>
         </p:spPr>
@@ -11726,7 +11726,7 @@
           </a:ln>
           <a:extLst>
             <a:ext uri="{C572A759-6A51-4108-AA02-DFA0A04FC94B}">
-              <ma14:wrappingTextBoxFlag xmlns:ma14="http://schemas.microsoft.com/office/mac/drawingml/2011/main" xmlns:a14="http://schemas.microsoft.com/office/drawing/2010/main" xmlns:m="http://schemas.openxmlformats.org/officeDocument/2006/math" xmlns="" val="1"/>
+              <ma14:wrappingTextBoxFlag xmlns="" xmlns:m="http://schemas.openxmlformats.org/officeDocument/2006/math" xmlns:a14="http://schemas.microsoft.com/office/drawing/2010/main" xmlns:ma14="http://schemas.microsoft.com/office/mac/drawingml/2011/main" val="1"/>
             </a:ext>
           </a:extLst>
         </p:spPr>
@@ -11763,7 +11763,7 @@
           </a:ln>
           <a:extLst>
             <a:ext uri="{C572A759-6A51-4108-AA02-DFA0A04FC94B}">
-              <ma14:wrappingTextBoxFlag xmlns:ma14="http://schemas.microsoft.com/office/mac/drawingml/2011/main" xmlns:a14="http://schemas.microsoft.com/office/drawing/2010/main" xmlns:m="http://schemas.openxmlformats.org/officeDocument/2006/math" xmlns="" val="1"/>
+              <ma14:wrappingTextBoxFlag xmlns="" xmlns:m="http://schemas.openxmlformats.org/officeDocument/2006/math" xmlns:a14="http://schemas.microsoft.com/office/drawing/2010/main" xmlns:ma14="http://schemas.microsoft.com/office/mac/drawingml/2011/main" val="1"/>
             </a:ext>
           </a:extLst>
         </p:spPr>
@@ -11905,7 +11905,7 @@
           </a:ln>
           <a:extLst>
             <a:ext uri="{C572A759-6A51-4108-AA02-DFA0A04FC94B}">
-              <ma14:wrappingTextBoxFlag xmlns:ma14="http://schemas.microsoft.com/office/mac/drawingml/2011/main" xmlns:a14="http://schemas.microsoft.com/office/drawing/2010/main" xmlns:m="http://schemas.openxmlformats.org/officeDocument/2006/math" xmlns="" val="1"/>
+              <ma14:wrappingTextBoxFlag xmlns="" xmlns:m="http://schemas.openxmlformats.org/officeDocument/2006/math" xmlns:a14="http://schemas.microsoft.com/office/drawing/2010/main" xmlns:ma14="http://schemas.microsoft.com/office/mac/drawingml/2011/main" val="1"/>
             </a:ext>
           </a:extLst>
         </p:spPr>
@@ -12021,7 +12021,7 @@
           </a:ln>
           <a:extLst>
             <a:ext uri="{C572A759-6A51-4108-AA02-DFA0A04FC94B}">
-              <ma14:wrappingTextBoxFlag xmlns:ma14="http://schemas.microsoft.com/office/mac/drawingml/2011/main" xmlns:a14="http://schemas.microsoft.com/office/drawing/2010/main" xmlns:m="http://schemas.openxmlformats.org/officeDocument/2006/math" xmlns="" val="1"/>
+              <ma14:wrappingTextBoxFlag xmlns="" xmlns:m="http://schemas.openxmlformats.org/officeDocument/2006/math" xmlns:a14="http://schemas.microsoft.com/office/drawing/2010/main" xmlns:ma14="http://schemas.microsoft.com/office/mac/drawingml/2011/main" val="1"/>
             </a:ext>
           </a:extLst>
         </p:spPr>
@@ -12058,7 +12058,7 @@
           </a:ln>
           <a:extLst>
             <a:ext uri="{C572A759-6A51-4108-AA02-DFA0A04FC94B}">
-              <ma14:wrappingTextBoxFlag xmlns:ma14="http://schemas.microsoft.com/office/mac/drawingml/2011/main" xmlns:a14="http://schemas.microsoft.com/office/drawing/2010/main" xmlns:m="http://schemas.openxmlformats.org/officeDocument/2006/math" xmlns="" val="1"/>
+              <ma14:wrappingTextBoxFlag xmlns="" xmlns:m="http://schemas.openxmlformats.org/officeDocument/2006/math" xmlns:a14="http://schemas.microsoft.com/office/drawing/2010/main" xmlns:ma14="http://schemas.microsoft.com/office/mac/drawingml/2011/main" val="1"/>
             </a:ext>
           </a:extLst>
         </p:spPr>
@@ -12542,7 +12542,7 @@
           </a:ln>
           <a:extLst>
             <a:ext uri="{C572A759-6A51-4108-AA02-DFA0A04FC94B}">
-              <ma14:wrappingTextBoxFlag xmlns:ma14="http://schemas.microsoft.com/office/mac/drawingml/2011/main" xmlns:a14="http://schemas.microsoft.com/office/drawing/2010/main" xmlns:m="http://schemas.openxmlformats.org/officeDocument/2006/math" xmlns="" val="1"/>
+              <ma14:wrappingTextBoxFlag xmlns="" xmlns:m="http://schemas.openxmlformats.org/officeDocument/2006/math" xmlns:a14="http://schemas.microsoft.com/office/drawing/2010/main" xmlns:ma14="http://schemas.microsoft.com/office/mac/drawingml/2011/main" val="1"/>
             </a:ext>
           </a:extLst>
         </p:spPr>
@@ -12579,7 +12579,7 @@
           </a:ln>
           <a:extLst>
             <a:ext uri="{C572A759-6A51-4108-AA02-DFA0A04FC94B}">
-              <ma14:wrappingTextBoxFlag xmlns:ma14="http://schemas.microsoft.com/office/mac/drawingml/2011/main" xmlns:a14="http://schemas.microsoft.com/office/drawing/2010/main" xmlns:m="http://schemas.openxmlformats.org/officeDocument/2006/math" xmlns="" val="1"/>
+              <ma14:wrappingTextBoxFlag xmlns="" xmlns:m="http://schemas.openxmlformats.org/officeDocument/2006/math" xmlns:a14="http://schemas.microsoft.com/office/drawing/2010/main" xmlns:ma14="http://schemas.microsoft.com/office/mac/drawingml/2011/main" val="1"/>
             </a:ext>
           </a:extLst>
         </p:spPr>
@@ -12734,7 +12734,7 @@
           </a:ln>
           <a:extLst>
             <a:ext uri="{C572A759-6A51-4108-AA02-DFA0A04FC94B}">
-              <ma14:wrappingTextBoxFlag xmlns:ma14="http://schemas.microsoft.com/office/mac/drawingml/2011/main" xmlns:a14="http://schemas.microsoft.com/office/drawing/2010/main" xmlns:m="http://schemas.openxmlformats.org/officeDocument/2006/math" xmlns="" val="1"/>
+              <ma14:wrappingTextBoxFlag xmlns="" xmlns:m="http://schemas.openxmlformats.org/officeDocument/2006/math" xmlns:a14="http://schemas.microsoft.com/office/drawing/2010/main" xmlns:ma14="http://schemas.microsoft.com/office/mac/drawingml/2011/main" val="1"/>
             </a:ext>
           </a:extLst>
         </p:spPr>
@@ -12794,7 +12794,7 @@
           </a:ln>
           <a:extLst>
             <a:ext uri="{C572A759-6A51-4108-AA02-DFA0A04FC94B}">
-              <ma14:wrappingTextBoxFlag xmlns:ma14="http://schemas.microsoft.com/office/mac/drawingml/2011/main" xmlns:a14="http://schemas.microsoft.com/office/drawing/2010/main" xmlns:m="http://schemas.openxmlformats.org/officeDocument/2006/math" xmlns="" val="1"/>
+              <ma14:wrappingTextBoxFlag xmlns="" xmlns:m="http://schemas.openxmlformats.org/officeDocument/2006/math" xmlns:a14="http://schemas.microsoft.com/office/drawing/2010/main" xmlns:ma14="http://schemas.microsoft.com/office/mac/drawingml/2011/main" val="1"/>
             </a:ext>
           </a:extLst>
         </p:spPr>
@@ -12851,7 +12851,7 @@
           </a:ln>
           <a:extLst>
             <a:ext uri="{C572A759-6A51-4108-AA02-DFA0A04FC94B}">
-              <ma14:wrappingTextBoxFlag xmlns:ma14="http://schemas.microsoft.com/office/mac/drawingml/2011/main" xmlns:a14="http://schemas.microsoft.com/office/drawing/2010/main" xmlns:m="http://schemas.openxmlformats.org/officeDocument/2006/math" xmlns="" val="1"/>
+              <ma14:wrappingTextBoxFlag xmlns="" xmlns:m="http://schemas.openxmlformats.org/officeDocument/2006/math" xmlns:a14="http://schemas.microsoft.com/office/drawing/2010/main" xmlns:ma14="http://schemas.microsoft.com/office/mac/drawingml/2011/main" val="1"/>
             </a:ext>
           </a:extLst>
         </p:spPr>
@@ -13002,7 +13002,7 @@
           </a:ln>
           <a:extLst>
             <a:ext uri="{C572A759-6A51-4108-AA02-DFA0A04FC94B}">
-              <ma14:wrappingTextBoxFlag xmlns:ma14="http://schemas.microsoft.com/office/mac/drawingml/2011/main" xmlns:a14="http://schemas.microsoft.com/office/drawing/2010/main" xmlns:m="http://schemas.openxmlformats.org/officeDocument/2006/math" xmlns="" val="1"/>
+              <ma14:wrappingTextBoxFlag xmlns="" xmlns:m="http://schemas.openxmlformats.org/officeDocument/2006/math" xmlns:a14="http://schemas.microsoft.com/office/drawing/2010/main" xmlns:ma14="http://schemas.microsoft.com/office/mac/drawingml/2011/main" val="1"/>
             </a:ext>
           </a:extLst>
         </p:spPr>
@@ -13105,7 +13105,7 @@
           </a:ln>
           <a:extLst>
             <a:ext uri="{C572A759-6A51-4108-AA02-DFA0A04FC94B}">
-              <ma14:wrappingTextBoxFlag xmlns:ma14="http://schemas.microsoft.com/office/mac/drawingml/2011/main" xmlns:a14="http://schemas.microsoft.com/office/drawing/2010/main" xmlns:m="http://schemas.openxmlformats.org/officeDocument/2006/math" xmlns="" val="1"/>
+              <ma14:wrappingTextBoxFlag xmlns="" xmlns:m="http://schemas.openxmlformats.org/officeDocument/2006/math" xmlns:a14="http://schemas.microsoft.com/office/drawing/2010/main" xmlns:ma14="http://schemas.microsoft.com/office/mac/drawingml/2011/main" val="1"/>
             </a:ext>
           </a:extLst>
         </p:spPr>
@@ -13213,7 +13213,7 @@
           </a:ln>
           <a:extLst>
             <a:ext uri="{C572A759-6A51-4108-AA02-DFA0A04FC94B}">
-              <ma14:wrappingTextBoxFlag xmlns:ma14="http://schemas.microsoft.com/office/mac/drawingml/2011/main" xmlns:a14="http://schemas.microsoft.com/office/drawing/2010/main" xmlns:m="http://schemas.openxmlformats.org/officeDocument/2006/math" xmlns="" val="1"/>
+              <ma14:wrappingTextBoxFlag xmlns="" xmlns:m="http://schemas.openxmlformats.org/officeDocument/2006/math" xmlns:a14="http://schemas.microsoft.com/office/drawing/2010/main" xmlns:ma14="http://schemas.microsoft.com/office/mac/drawingml/2011/main" val="1"/>
             </a:ext>
           </a:extLst>
         </p:spPr>
@@ -13250,7 +13250,7 @@
           </a:ln>
           <a:extLst>
             <a:ext uri="{C572A759-6A51-4108-AA02-DFA0A04FC94B}">
-              <ma14:wrappingTextBoxFlag xmlns:ma14="http://schemas.microsoft.com/office/mac/drawingml/2011/main" xmlns:a14="http://schemas.microsoft.com/office/drawing/2010/main" xmlns:m="http://schemas.openxmlformats.org/officeDocument/2006/math" xmlns="" val="1"/>
+              <ma14:wrappingTextBoxFlag xmlns="" xmlns:m="http://schemas.openxmlformats.org/officeDocument/2006/math" xmlns:a14="http://schemas.microsoft.com/office/drawing/2010/main" xmlns:ma14="http://schemas.microsoft.com/office/mac/drawingml/2011/main" val="1"/>
             </a:ext>
           </a:extLst>
         </p:spPr>
@@ -13380,7 +13380,7 @@
           </a:ln>
           <a:extLst>
             <a:ext uri="{C572A759-6A51-4108-AA02-DFA0A04FC94B}">
-              <ma14:wrappingTextBoxFlag xmlns:ma14="http://schemas.microsoft.com/office/mac/drawingml/2011/main" xmlns:a14="http://schemas.microsoft.com/office/drawing/2010/main" xmlns:m="http://schemas.openxmlformats.org/officeDocument/2006/math" xmlns="" val="1"/>
+              <ma14:wrappingTextBoxFlag xmlns="" xmlns:m="http://schemas.openxmlformats.org/officeDocument/2006/math" xmlns:a14="http://schemas.microsoft.com/office/drawing/2010/main" xmlns:ma14="http://schemas.microsoft.com/office/mac/drawingml/2011/main" val="1"/>
             </a:ext>
           </a:extLst>
         </p:spPr>
@@ -13496,7 +13496,7 @@
           </a:ln>
           <a:extLst>
             <a:ext uri="{C572A759-6A51-4108-AA02-DFA0A04FC94B}">
-              <ma14:wrappingTextBoxFlag xmlns:ma14="http://schemas.microsoft.com/office/mac/drawingml/2011/main" xmlns:a14="http://schemas.microsoft.com/office/drawing/2010/main" xmlns:m="http://schemas.openxmlformats.org/officeDocument/2006/math" xmlns="" val="1"/>
+              <ma14:wrappingTextBoxFlag xmlns="" xmlns:m="http://schemas.openxmlformats.org/officeDocument/2006/math" xmlns:a14="http://schemas.microsoft.com/office/drawing/2010/main" xmlns:ma14="http://schemas.microsoft.com/office/mac/drawingml/2011/main" val="1"/>
             </a:ext>
           </a:extLst>
         </p:spPr>
@@ -13533,7 +13533,7 @@
           </a:ln>
           <a:extLst>
             <a:ext uri="{C572A759-6A51-4108-AA02-DFA0A04FC94B}">
-              <ma14:wrappingTextBoxFlag xmlns:ma14="http://schemas.microsoft.com/office/mac/drawingml/2011/main" xmlns:a14="http://schemas.microsoft.com/office/drawing/2010/main" xmlns:m="http://schemas.openxmlformats.org/officeDocument/2006/math" xmlns="" val="1"/>
+              <ma14:wrappingTextBoxFlag xmlns="" xmlns:m="http://schemas.openxmlformats.org/officeDocument/2006/math" xmlns:a14="http://schemas.microsoft.com/office/drawing/2010/main" xmlns:ma14="http://schemas.microsoft.com/office/mac/drawingml/2011/main" val="1"/>
             </a:ext>
           </a:extLst>
         </p:spPr>
@@ -13760,7 +13760,7 @@
           </a:ln>
           <a:extLst>
             <a:ext uri="{C572A759-6A51-4108-AA02-DFA0A04FC94B}">
-              <ma14:wrappingTextBoxFlag xmlns:ma14="http://schemas.microsoft.com/office/mac/drawingml/2011/main" xmlns:a14="http://schemas.microsoft.com/office/drawing/2010/main" xmlns:m="http://schemas.openxmlformats.org/officeDocument/2006/math" xmlns="" val="1"/>
+              <ma14:wrappingTextBoxFlag xmlns="" xmlns:m="http://schemas.openxmlformats.org/officeDocument/2006/math" xmlns:a14="http://schemas.microsoft.com/office/drawing/2010/main" xmlns:ma14="http://schemas.microsoft.com/office/mac/drawingml/2011/main" val="1"/>
             </a:ext>
           </a:extLst>
         </p:spPr>
@@ -13797,7 +13797,7 @@
           </a:ln>
           <a:extLst>
             <a:ext uri="{C572A759-6A51-4108-AA02-DFA0A04FC94B}">
-              <ma14:wrappingTextBoxFlag xmlns:ma14="http://schemas.microsoft.com/office/mac/drawingml/2011/main" xmlns:a14="http://schemas.microsoft.com/office/drawing/2010/main" xmlns:m="http://schemas.openxmlformats.org/officeDocument/2006/math" xmlns="" val="1"/>
+              <ma14:wrappingTextBoxFlag xmlns="" xmlns:m="http://schemas.openxmlformats.org/officeDocument/2006/math" xmlns:a14="http://schemas.microsoft.com/office/drawing/2010/main" xmlns:ma14="http://schemas.microsoft.com/office/mac/drawingml/2011/main" val="1"/>
             </a:ext>
           </a:extLst>
         </p:spPr>
@@ -14104,7 +14104,7 @@
           </a:ln>
           <a:extLst>
             <a:ext uri="{C572A759-6A51-4108-AA02-DFA0A04FC94B}">
-              <ma14:wrappingTextBoxFlag xmlns:ma14="http://schemas.microsoft.com/office/mac/drawingml/2011/main" xmlns:a14="http://schemas.microsoft.com/office/drawing/2010/main" xmlns:m="http://schemas.openxmlformats.org/officeDocument/2006/math" xmlns="" val="1"/>
+              <ma14:wrappingTextBoxFlag xmlns="" xmlns:m="http://schemas.openxmlformats.org/officeDocument/2006/math" xmlns:a14="http://schemas.microsoft.com/office/drawing/2010/main" xmlns:ma14="http://schemas.microsoft.com/office/mac/drawingml/2011/main" val="1"/>
             </a:ext>
           </a:extLst>
         </p:spPr>
@@ -14141,7 +14141,7 @@
           </a:ln>
           <a:extLst>
             <a:ext uri="{C572A759-6A51-4108-AA02-DFA0A04FC94B}">
-              <ma14:wrappingTextBoxFlag xmlns:ma14="http://schemas.microsoft.com/office/mac/drawingml/2011/main" xmlns:a14="http://schemas.microsoft.com/office/drawing/2010/main" xmlns:m="http://schemas.openxmlformats.org/officeDocument/2006/math" xmlns="" val="1"/>
+              <ma14:wrappingTextBoxFlag xmlns="" xmlns:m="http://schemas.openxmlformats.org/officeDocument/2006/math" xmlns:a14="http://schemas.microsoft.com/office/drawing/2010/main" xmlns:ma14="http://schemas.microsoft.com/office/mac/drawingml/2011/main" val="1"/>
             </a:ext>
           </a:extLst>
         </p:spPr>
@@ -14262,7 +14262,7 @@
           </a:ln>
           <a:extLst>
             <a:ext uri="{C572A759-6A51-4108-AA02-DFA0A04FC94B}">
-              <ma14:wrappingTextBoxFlag xmlns:ma14="http://schemas.microsoft.com/office/mac/drawingml/2011/main" xmlns:a14="http://schemas.microsoft.com/office/drawing/2010/main" xmlns:m="http://schemas.openxmlformats.org/officeDocument/2006/math" xmlns="" val="1"/>
+              <ma14:wrappingTextBoxFlag xmlns="" xmlns:m="http://schemas.openxmlformats.org/officeDocument/2006/math" xmlns:a14="http://schemas.microsoft.com/office/drawing/2010/main" xmlns:ma14="http://schemas.microsoft.com/office/mac/drawingml/2011/main" val="1"/>
             </a:ext>
           </a:extLst>
         </p:spPr>
@@ -14323,7 +14323,7 @@
           </a:ln>
           <a:extLst>
             <a:ext uri="{C572A759-6A51-4108-AA02-DFA0A04FC94B}">
-              <ma14:wrappingTextBoxFlag xmlns:ma14="http://schemas.microsoft.com/office/mac/drawingml/2011/main" xmlns:a14="http://schemas.microsoft.com/office/drawing/2010/main" xmlns:m="http://schemas.openxmlformats.org/officeDocument/2006/math" xmlns="" val="1"/>
+              <ma14:wrappingTextBoxFlag xmlns="" xmlns:m="http://schemas.openxmlformats.org/officeDocument/2006/math" xmlns:a14="http://schemas.microsoft.com/office/drawing/2010/main" xmlns:ma14="http://schemas.microsoft.com/office/mac/drawingml/2011/main" val="1"/>
             </a:ext>
           </a:extLst>
         </p:spPr>

</xml_diff>